<commit_message>
codes and slides for chapter 5
</commit_message>
<xml_diff>
--- a/wrangling_with_r_bio18.pptx
+++ b/wrangling_with_r_bio18.pptx
@@ -5,10 +5,10 @@
     <p:sldMasterId id="2147483648" r:id="rId4"/>
   </p:sldMasterIdLst>
   <p:notesMasterIdLst>
-    <p:notesMasterId r:id="rId31"/>
+    <p:notesMasterId r:id="rId41"/>
   </p:notesMasterIdLst>
   <p:handoutMasterIdLst>
-    <p:handoutMasterId r:id="rId32"/>
+    <p:handoutMasterId r:id="rId42"/>
   </p:handoutMasterIdLst>
   <p:sldIdLst>
     <p:sldId id="256" r:id="rId5"/>
@@ -29,14 +29,24 @@
     <p:sldId id="284" r:id="rId20"/>
     <p:sldId id="285" r:id="rId21"/>
     <p:sldId id="286" r:id="rId22"/>
-    <p:sldId id="272" r:id="rId23"/>
-    <p:sldId id="265" r:id="rId24"/>
-    <p:sldId id="266" r:id="rId25"/>
-    <p:sldId id="267" r:id="rId26"/>
-    <p:sldId id="273" r:id="rId27"/>
-    <p:sldId id="260" r:id="rId28"/>
-    <p:sldId id="268" r:id="rId29"/>
-    <p:sldId id="269" r:id="rId30"/>
+    <p:sldId id="287" r:id="rId23"/>
+    <p:sldId id="288" r:id="rId24"/>
+    <p:sldId id="290" r:id="rId25"/>
+    <p:sldId id="291" r:id="rId26"/>
+    <p:sldId id="292" r:id="rId27"/>
+    <p:sldId id="293" r:id="rId28"/>
+    <p:sldId id="294" r:id="rId29"/>
+    <p:sldId id="295" r:id="rId30"/>
+    <p:sldId id="297" r:id="rId31"/>
+    <p:sldId id="296" r:id="rId32"/>
+    <p:sldId id="272" r:id="rId33"/>
+    <p:sldId id="265" r:id="rId34"/>
+    <p:sldId id="266" r:id="rId35"/>
+    <p:sldId id="267" r:id="rId36"/>
+    <p:sldId id="273" r:id="rId37"/>
+    <p:sldId id="260" r:id="rId38"/>
+    <p:sldId id="268" r:id="rId39"/>
+    <p:sldId id="269" r:id="rId40"/>
   </p:sldIdLst>
   <p:sldSz cx="12192000" cy="6858000"/>
   <p:notesSz cx="7102475" cy="10234613"/>
@@ -24365,7 +24375,8 @@
           <a:p>
             <a:r>
               <a:rPr lang="en-US" smtClean="0">
-                <a:latin typeface="Corbel" panose="020B0503020204020204" pitchFamily="34" charset="0"/>
+                <a:latin typeface="Consolas" panose="020B0609020204030204" pitchFamily="49" charset="0"/>
+                <a:cs typeface="Consolas" panose="020B0609020204030204" pitchFamily="49" charset="0"/>
               </a:rPr>
               <a:t>+ coord_flip()</a:t>
             </a:r>
@@ -24488,7 +24499,7 @@
           <a:p>
             <a:r>
               <a:rPr lang="en-US" smtClean="0"/>
-              <a:t>ggplot2</a:t>
+              <a:t>5.1.3 dplyr basics</a:t>
             </a:r>
             <a:endParaRPr lang="en-US"/>
           </a:p>
@@ -24511,80 +24522,121 @@
           <a:p>
             <a:r>
               <a:rPr lang="en-US" smtClean="0"/>
-              <a:t>"It's </a:t>
-            </a:r>
+              <a:t>We have 6 </a:t>
+            </a:r>
+            <a:r>
+              <a:rPr lang="en-US" i="1" smtClean="0"/>
+              <a:t>verbs</a:t>
+            </a:r>
+            <a:r>
+              <a:rPr lang="en-US" smtClean="0"/>
+              <a:t>: </a:t>
+            </a:r>
+            <a:r>
+              <a:rPr lang="en-US">
+                <a:latin typeface="Consolas" panose="020B0609020204030204" pitchFamily="49" charset="0"/>
+                <a:cs typeface="Consolas" panose="020B0609020204030204" pitchFamily="49" charset="0"/>
+              </a:rPr>
+              <a:t>filter</a:t>
+            </a:r>
+            <a:r>
+              <a:rPr lang="en-US" smtClean="0"/>
+              <a:t>, </a:t>
+            </a:r>
+            <a:r>
+              <a:rPr lang="en-US">
+                <a:latin typeface="Consolas" panose="020B0609020204030204" pitchFamily="49" charset="0"/>
+                <a:cs typeface="Consolas" panose="020B0609020204030204" pitchFamily="49" charset="0"/>
+              </a:rPr>
+              <a:t>arrange</a:t>
+            </a:r>
+            <a:r>
+              <a:rPr lang="en-US" smtClean="0"/>
+              <a:t>, </a:t>
+            </a:r>
+            <a:r>
+              <a:rPr lang="en-US">
+                <a:latin typeface="Consolas" panose="020B0609020204030204" pitchFamily="49" charset="0"/>
+                <a:cs typeface="Consolas" panose="020B0609020204030204" pitchFamily="49" charset="0"/>
+              </a:rPr>
+              <a:t>select</a:t>
+            </a:r>
+            <a:r>
+              <a:rPr lang="en-US" smtClean="0"/>
+              <a:t>, </a:t>
+            </a:r>
+            <a:r>
+              <a:rPr lang="en-US">
+                <a:latin typeface="Consolas" panose="020B0609020204030204" pitchFamily="49" charset="0"/>
+                <a:cs typeface="Consolas" panose="020B0609020204030204" pitchFamily="49" charset="0"/>
+              </a:rPr>
+              <a:t>mutate</a:t>
+            </a:r>
+            <a:r>
+              <a:rPr lang="en-US" smtClean="0"/>
+              <a:t>, </a:t>
+            </a:r>
+            <a:r>
+              <a:rPr lang="en-US">
+                <a:latin typeface="Consolas" panose="020B0609020204030204" pitchFamily="49" charset="0"/>
+                <a:cs typeface="Consolas" panose="020B0609020204030204" pitchFamily="49" charset="0"/>
+              </a:rPr>
+              <a:t>summarise </a:t>
+            </a:r>
+            <a:r>
+              <a:rPr lang="en-US" smtClean="0"/>
+              <a:t>and </a:t>
+            </a:r>
+            <a:r>
+              <a:rPr lang="en-US" smtClean="0">
+                <a:latin typeface="Consolas" panose="020B0609020204030204" pitchFamily="49" charset="0"/>
+                <a:cs typeface="Consolas" panose="020B0609020204030204" pitchFamily="49" charset="0"/>
+              </a:rPr>
+              <a:t>group_by</a:t>
+            </a:r>
+            <a:r>
+              <a:rPr lang="en-US" smtClean="0"/>
+              <a:t> </a:t>
+            </a:r>
+          </a:p>
+          <a:p>
+            <a:r>
+              <a:rPr lang="en-US" smtClean="0"/>
+              <a:t>Each verb is a function that behaves in the same way:</a:t>
+            </a:r>
+          </a:p>
+          <a:p>
+            <a:pPr marL="457200" indent="-457200">
+              <a:buFont typeface="+mj-lt"/>
+              <a:buAutoNum type="arabicPeriod"/>
+            </a:pPr>
             <a:r>
               <a:rPr lang="en-US"/>
-              <a:t>hard to succintly describe how ggplot2 works because it embodies a deep philosophy of visualisation</a:t>
-            </a:r>
-            <a:r>
-              <a:rPr lang="en-US" smtClean="0"/>
-              <a:t>."</a:t>
-            </a:r>
-          </a:p>
-          <a:p>
-            <a:r>
-              <a:rPr lang="en-US" smtClean="0"/>
-              <a:t>But here's a simple example:</a:t>
-            </a:r>
-          </a:p>
-          <a:p>
-            <a:pPr marL="349200" lvl="1" indent="0">
-              <a:buNone/>
+              <a:t>The first argument is a data frame.</a:t>
+            </a:r>
+          </a:p>
+          <a:p>
+            <a:pPr marL="457200" indent="-457200">
+              <a:buFont typeface="+mj-lt"/>
+              <a:buAutoNum type="arabicPeriod"/>
             </a:pPr>
             <a:r>
-              <a:rPr lang="en-US" smtClean="0"/>
-              <a:t>ggplot(iris)+</a:t>
-            </a:r>
-          </a:p>
-          <a:p>
-            <a:pPr marL="349200" lvl="1" indent="0">
-              <a:buNone/>
+              <a:rPr lang="en-US"/>
+              <a:t>The subsequent arguments describe what to do with the data frame, using the variable names (without quotes).</a:t>
+            </a:r>
+          </a:p>
+          <a:p>
+            <a:pPr marL="457200" indent="-457200">
+              <a:buFont typeface="+mj-lt"/>
+              <a:buAutoNum type="arabicPeriod"/>
             </a:pPr>
             <a:r>
-              <a:rPr lang="en-US" smtClean="0"/>
-              <a:t>geom_point(aes(x=Sepal.Width, y=Sepal.Length, col=Species))</a:t>
-            </a:r>
+              <a:rPr lang="en-US"/>
+              <a:t>The result is a new data frame.</a:t>
+            </a:r>
+          </a:p>
+          <a:p>
             <a:endParaRPr lang="en-US"/>
-          </a:p>
-          <a:p>
-            <a:r>
-              <a:rPr lang="en-US" smtClean="0"/>
-              <a:t>Think of that as saying: "Hey ggplot, I want to make a graph out of the iris data </a:t>
-            </a:r>
-            <a:r>
-              <a:rPr lang="en-US"/>
-              <a:t>set. And I want there to be </a:t>
-            </a:r>
-            <a:r>
-              <a:rPr lang="en-US" smtClean="0"/>
-              <a:t>points, </a:t>
-            </a:r>
-            <a:r>
-              <a:rPr lang="en-US"/>
-              <a:t>so </a:t>
-            </a:r>
-            <a:r>
-              <a:rPr lang="en-US" smtClean="0"/>
-              <a:t>that Sepal.Width maps to their x coord., Sepal.Length to y coord., and Species to their color."</a:t>
-            </a:r>
-          </a:p>
-          <a:p>
-            <a:r>
-              <a:rPr lang="en-US"/>
-              <a:t>Please </a:t>
-            </a:r>
-            <a:r>
-              <a:rPr lang="en-US" smtClean="0"/>
-              <a:t>read </a:t>
-            </a:r>
-            <a:r>
-              <a:rPr lang="en-US">
-                <a:hlinkClick r:id="rId2" tooltip="http://r4ds.had.co.nz/data-visualisation.html"/>
-              </a:rPr>
-              <a:t>http://r4ds.had.co.nz/data-visualisation.html</a:t>
-            </a:r>
-            <a:endParaRPr lang="en-US" smtClean="0"/>
           </a:p>
         </p:txBody>
       </p:sp>
@@ -24646,20 +24698,13 @@
     </p:spTree>
     <p:extLst>
       <p:ext uri="{BB962C8B-B14F-4D97-AF65-F5344CB8AC3E}">
-        <p14:creationId xmlns:p14="http://schemas.microsoft.com/office/powerpoint/2010/main" val="2176735659"/>
+        <p14:creationId xmlns:p14="http://schemas.microsoft.com/office/powerpoint/2010/main" val="2516587120"/>
       </p:ext>
     </p:extLst>
   </p:cSld>
   <p:clrMapOvr>
     <a:masterClrMapping/>
   </p:clrMapOvr>
-  <p:timing>
-    <p:tnLst>
-      <p:par>
-        <p:cTn id="1" dur="indefinite" restart="never" nodeType="tmRoot"/>
-      </p:par>
-    </p:tnLst>
-  </p:timing>
 </p:sld>
 </file>
 
@@ -24869,13 +24914,26 @@
           <a:p>
             <a:r>
               <a:rPr lang="en-US"/>
-              <a:t>f</a:t>
-            </a:r>
-            <a:r>
-              <a:rPr lang="en-US" smtClean="0"/>
-              <a:t>ilter, arrange, select</a:t>
-            </a:r>
-            <a:endParaRPr lang="en-US"/>
+              <a:t>5.2 Filter rows with </a:t>
+            </a:r>
+            <a:r>
+              <a:rPr lang="en-US">
+                <a:latin typeface="Consolas" panose="020B0609020204030204" pitchFamily="49" charset="0"/>
+                <a:cs typeface="Consolas" panose="020B0609020204030204" pitchFamily="49" charset="0"/>
+              </a:rPr>
+              <a:t>filter</a:t>
+            </a:r>
+            <a:r>
+              <a:rPr lang="en-US" smtClean="0">
+                <a:latin typeface="Consolas" panose="020B0609020204030204" pitchFamily="49" charset="0"/>
+                <a:cs typeface="Consolas" panose="020B0609020204030204" pitchFamily="49" charset="0"/>
+              </a:rPr>
+              <a:t>()</a:t>
+            </a:r>
+            <a:endParaRPr lang="en-US">
+              <a:latin typeface="Consolas" panose="020B0609020204030204" pitchFamily="49" charset="0"/>
+              <a:cs typeface="Consolas" panose="020B0609020204030204" pitchFamily="49" charset="0"/>
+            </a:endParaRPr>
           </a:p>
         </p:txBody>
       </p:sp>
@@ -24896,85 +24954,34 @@
           <a:p>
             <a:r>
               <a:rPr lang="en-US" smtClean="0"/>
-              <a:t>Please read </a:t>
+              <a:t>The </a:t>
+            </a:r>
+            <a:r>
+              <a:rPr lang="en-US"/>
+              <a:t>first argument is the name of the data frame. The second and subsequent arguments are the expressions that filter the </a:t>
+            </a:r>
+            <a:r>
+              <a:rPr lang="en-US"/>
+              <a:t>data </a:t>
+            </a:r>
+            <a:r>
+              <a:rPr lang="en-US" smtClean="0"/>
+              <a:t>frame</a:t>
+            </a:r>
+            <a:endParaRPr lang="en-US"/>
+          </a:p>
+          <a:p>
+            <a:r>
+              <a:rPr lang="en-US" smtClean="0"/>
+              <a:t>Remember the usual comparison operators and the shorthand </a:t>
             </a:r>
             <a:r>
               <a:rPr lang="en-US" smtClean="0">
-                <a:hlinkClick r:id="rId2"/>
+                <a:latin typeface="Consolas" panose="020B0609020204030204" pitchFamily="49" charset="0"/>
+                <a:cs typeface="Consolas" panose="020B0609020204030204" pitchFamily="49" charset="0"/>
               </a:rPr>
-              <a:t>http://r4ds.had.co.nz/transform.html</a:t>
-            </a:r>
-            <a:r>
-              <a:rPr lang="en-US" smtClean="0"/>
-              <a:t> and the Data Wrangling cheat sheet</a:t>
-            </a:r>
-            <a:endParaRPr lang="en-US" dirty="0" smtClean="0"/>
-          </a:p>
-          <a:p>
-            <a:r>
-              <a:rPr lang="en-US" i="1" dirty="0" smtClean="0"/>
-              <a:t>filter</a:t>
-            </a:r>
-            <a:r>
-              <a:rPr lang="en-US" dirty="0" smtClean="0"/>
-              <a:t> is the function in </a:t>
-            </a:r>
-            <a:r>
-              <a:rPr lang="en-US" i="1" dirty="0" err="1" smtClean="0"/>
-              <a:t>dplyr</a:t>
-            </a:r>
-            <a:r>
-              <a:rPr lang="en-US" dirty="0" smtClean="0"/>
-              <a:t> that works like subset in base R</a:t>
-            </a:r>
-          </a:p>
-          <a:p>
-            <a:pPr lvl="1"/>
-            <a:r>
-              <a:rPr lang="en-US" dirty="0" smtClean="0"/>
-              <a:t>note the ready made functions for random sampling, and extracting unique rows</a:t>
-            </a:r>
-          </a:p>
-          <a:p>
-            <a:r>
-              <a:rPr lang="en-US" i="1"/>
-              <a:t>arrange</a:t>
-            </a:r>
-            <a:r>
-              <a:rPr lang="en-US"/>
-              <a:t> is the function for arranging rows according to values of a </a:t>
-            </a:r>
-            <a:r>
-              <a:rPr lang="en-US" smtClean="0"/>
-              <a:t>column</a:t>
-            </a:r>
-            <a:endParaRPr lang="en-US" i="1" smtClean="0"/>
-          </a:p>
-          <a:p>
-            <a:r>
-              <a:rPr lang="en-US" i="1" smtClean="0"/>
-              <a:t>select</a:t>
-            </a:r>
-            <a:r>
-              <a:rPr lang="en-US" smtClean="0"/>
-              <a:t> </a:t>
-            </a:r>
-            <a:r>
-              <a:rPr lang="en-US" dirty="0" smtClean="0"/>
-              <a:t>is the function for selecting columns</a:t>
-            </a:r>
-          </a:p>
-          <a:p>
-            <a:pPr lvl="1"/>
-            <a:r>
-              <a:rPr lang="en-US" dirty="0" smtClean="0"/>
-              <a:t>note the </a:t>
-            </a:r>
-            <a:r>
-              <a:rPr lang="en-US" smtClean="0"/>
-              <a:t>helper functions</a:t>
-            </a:r>
-            <a:endParaRPr lang="en-US" dirty="0" smtClean="0"/>
+              <a:t>%in%</a:t>
+            </a:r>
           </a:p>
         </p:txBody>
       </p:sp>
@@ -25036,20 +25043,13 @@
     </p:spTree>
     <p:extLst>
       <p:ext uri="{BB962C8B-B14F-4D97-AF65-F5344CB8AC3E}">
-        <p14:creationId xmlns:p14="http://schemas.microsoft.com/office/powerpoint/2010/main" val="581569891"/>
+        <p14:creationId xmlns:p14="http://schemas.microsoft.com/office/powerpoint/2010/main" val="1000813141"/>
       </p:ext>
     </p:extLst>
   </p:cSld>
   <p:clrMapOvr>
     <a:masterClrMapping/>
   </p:clrMapOvr>
-  <p:timing>
-    <p:tnLst>
-      <p:par>
-        <p:cTn id="1" dur="indefinite" restart="never" nodeType="tmRoot"/>
-      </p:par>
-    </p:tnLst>
-  </p:timing>
 </p:sld>
 </file>
 
@@ -25087,7 +25087,7 @@
           <a:p>
             <a:r>
               <a:rPr lang="en-US" smtClean="0"/>
-              <a:t>Making new variables</a:t>
+              <a:t>5.2.4 Exercises</a:t>
             </a:r>
             <a:endParaRPr lang="en-US"/>
           </a:p>
@@ -25103,88 +25103,164 @@
             <p:ph idx="1"/>
           </p:nvPr>
         </p:nvSpPr>
-        <p:spPr/>
+        <p:spPr>
+          <a:xfrm>
+            <a:off x="609600" y="1262130"/>
+            <a:ext cx="10749565" cy="4864033"/>
+          </a:xfrm>
+        </p:spPr>
         <p:txBody>
           <a:bodyPr/>
           <a:lstStyle/>
           <a:p>
-            <a:r>
-              <a:rPr lang="en-US" i="1" dirty="0" smtClean="0"/>
-              <a:t>mutate</a:t>
-            </a:r>
-            <a:r>
-              <a:rPr lang="en-US" dirty="0" smtClean="0"/>
-              <a:t> is the function for creating new variables</a:t>
+            <a:pPr marL="457200" indent="-457200">
+              <a:buFont typeface="+mj-lt"/>
+              <a:buAutoNum type="arabicPeriod"/>
+            </a:pPr>
+            <a:r>
+              <a:rPr lang="en-US" sz="1600"/>
+              <a:t>Find all flights that</a:t>
             </a:r>
           </a:p>
           <a:p>
             <a:pPr lvl="1"/>
             <a:r>
-              <a:rPr lang="en-US" dirty="0" smtClean="0"/>
-              <a:t>related to </a:t>
-            </a:r>
-            <a:r>
-              <a:rPr lang="en-US" i="1" dirty="0" smtClean="0"/>
-              <a:t>with</a:t>
-            </a:r>
-            <a:r>
-              <a:rPr lang="en-US" dirty="0" smtClean="0"/>
-              <a:t> and </a:t>
-            </a:r>
-            <a:r>
-              <a:rPr lang="en-US" i="1" dirty="0" smtClean="0"/>
-              <a:t>within</a:t>
-            </a:r>
-            <a:r>
-              <a:rPr lang="en-US" dirty="0" smtClean="0"/>
-              <a:t> functions of base R: no need for the $ notation</a:t>
+              <a:rPr lang="en-US" sz="1200"/>
+              <a:t>Had an arrival delay of two or more hours</a:t>
             </a:r>
           </a:p>
           <a:p>
             <a:pPr lvl="1"/>
             <a:r>
-              <a:rPr lang="en-US" dirty="0" smtClean="0"/>
-              <a:t>you can make many inside one function call, and use the new ones immediately</a:t>
-            </a:r>
-          </a:p>
-          <a:p>
-            <a:r>
-              <a:rPr lang="en-US" i="1" dirty="0" smtClean="0"/>
-              <a:t>transmute</a:t>
-            </a:r>
-            <a:r>
-              <a:rPr lang="en-US" dirty="0" smtClean="0"/>
-              <a:t> does the same but only keeps the created ones</a:t>
-            </a:r>
-          </a:p>
-          <a:p>
-            <a:r>
-              <a:rPr lang="en-US" dirty="0" smtClean="0"/>
-              <a:t>Both can be combined with </a:t>
-            </a:r>
-            <a:r>
-              <a:rPr lang="en-US" b="1" dirty="0" smtClean="0"/>
-              <a:t>window functions</a:t>
+              <a:rPr lang="en-US" sz="1200"/>
+              <a:t>Flew to Houston (IAH or HOU)</a:t>
             </a:r>
           </a:p>
           <a:p>
             <a:pPr lvl="1"/>
             <a:r>
-              <a:rPr lang="en-US" dirty="0" smtClean="0"/>
-              <a:t>these are functions that take one vector and return another of the same length</a:t>
+              <a:rPr lang="en-US" sz="1200"/>
+              <a:t>Were operated by United, American, or Delta</a:t>
             </a:r>
           </a:p>
           <a:p>
             <a:pPr lvl="1"/>
             <a:r>
-              <a:rPr lang="en-US" dirty="0" smtClean="0"/>
-              <a:t>such as lags, ranks, cumulative sums </a:t>
-            </a:r>
-            <a:r>
-              <a:rPr lang="en-US" dirty="0" err="1" smtClean="0"/>
-              <a:t>etc</a:t>
-            </a:r>
-            <a:endParaRPr lang="en-US" dirty="0"/>
+              <a:rPr lang="en-US" sz="1200"/>
+              <a:t>Departed in summer (July, August, and September)</a:t>
+            </a:r>
+          </a:p>
+          <a:p>
+            <a:pPr lvl="1"/>
+            <a:r>
+              <a:rPr lang="en-US" sz="1200"/>
+              <a:t>Arrived more than two hours late, but didn’t leave late</a:t>
+            </a:r>
+          </a:p>
+          <a:p>
+            <a:pPr lvl="1"/>
+            <a:r>
+              <a:rPr lang="en-US" sz="1200"/>
+              <a:t>Were delayed by at least an hour, but made up over 30 minutes in flight</a:t>
+            </a:r>
+          </a:p>
+          <a:p>
+            <a:pPr lvl="1"/>
+            <a:r>
+              <a:rPr lang="en-US" sz="1200"/>
+              <a:t>Departed between midnight and 6am (inclusive)</a:t>
+            </a:r>
+          </a:p>
+          <a:p>
+            <a:pPr marL="457200" indent="-457200">
+              <a:buFont typeface="+mj-lt"/>
+              <a:buAutoNum type="arabicPeriod"/>
+            </a:pPr>
+            <a:r>
+              <a:rPr lang="en-US" sz="1600"/>
+              <a:t>Another useful dplyr filtering helper is between(). What does it do? Can you use it to simplify the code needed to answer the previous </a:t>
+            </a:r>
+            <a:r>
+              <a:rPr lang="en-US" sz="1600"/>
+              <a:t>challenges</a:t>
+            </a:r>
+            <a:r>
+              <a:rPr lang="en-US" sz="1600" smtClean="0"/>
+              <a:t>?</a:t>
+            </a:r>
+            <a:endParaRPr lang="en-US" sz="1600"/>
+          </a:p>
+          <a:p>
+            <a:pPr marL="457200" indent="-457200">
+              <a:buFont typeface="+mj-lt"/>
+              <a:buAutoNum type="arabicPeriod"/>
+            </a:pPr>
+            <a:r>
+              <a:rPr lang="en-US" sz="1600"/>
+              <a:t>How many flights have a missing dep_time? What other variables are missing? What might these rows </a:t>
+            </a:r>
+            <a:r>
+              <a:rPr lang="en-US" sz="1600"/>
+              <a:t>represent</a:t>
+            </a:r>
+            <a:r>
+              <a:rPr lang="en-US" sz="1600" smtClean="0"/>
+              <a:t>?</a:t>
+            </a:r>
+            <a:endParaRPr lang="en-US" sz="1600"/>
+          </a:p>
+          <a:p>
+            <a:pPr marL="457200" indent="-457200">
+              <a:buFont typeface="+mj-lt"/>
+              <a:buAutoNum type="arabicPeriod"/>
+            </a:pPr>
+            <a:r>
+              <a:rPr lang="en-US" sz="1600"/>
+              <a:t>Why is NA ^ 0 not missing? Why is NA | TRUE not missing? Why is FALSE &amp; NA not missing? Can you figure out the general rule? (NA * 0 is a tricky </a:t>
+            </a:r>
+            <a:r>
+              <a:rPr lang="en-US" sz="1600"/>
+              <a:t>counterexample</a:t>
+            </a:r>
+            <a:r>
+              <a:rPr lang="en-US" sz="1600" smtClean="0"/>
+              <a:t>!)</a:t>
+            </a:r>
+            <a:endParaRPr lang="en-US" sz="1600" b="1"/>
+          </a:p>
+          <a:p>
+            <a:r>
+              <a:rPr lang="en-US" sz="1600">
+                <a:latin typeface="Corbel" panose="020B0503020204020204" pitchFamily="34" charset="0"/>
+                <a:cs typeface="Consolas" panose="020B0609020204030204" pitchFamily="49" charset="0"/>
+              </a:rPr>
+              <a:t>Suggested </a:t>
+            </a:r>
+            <a:r>
+              <a:rPr lang="en-US" sz="1600">
+                <a:latin typeface="Corbel" panose="020B0503020204020204" pitchFamily="34" charset="0"/>
+                <a:cs typeface="Consolas" panose="020B0609020204030204" pitchFamily="49" charset="0"/>
+              </a:rPr>
+              <a:t>order/importance</a:t>
+            </a:r>
+            <a:r>
+              <a:rPr lang="en-US" sz="1600" smtClean="0">
+                <a:latin typeface="Corbel" panose="020B0503020204020204" pitchFamily="34" charset="0"/>
+                <a:cs typeface="Consolas" panose="020B0609020204030204" pitchFamily="49" charset="0"/>
+              </a:rPr>
+              <a:t>: 1, then 2 and 3. 4 is for math geeks.</a:t>
+            </a:r>
+            <a:r>
+              <a:rPr lang="en-US" sz="1600" b="1" smtClean="0"/>
+              <a:t/>
+            </a:r>
+            <a:br>
+              <a:rPr lang="en-US" sz="1600" b="1" smtClean="0"/>
+            </a:br>
+            <a:endParaRPr lang="en-US" sz="1600" b="1" smtClean="0"/>
+          </a:p>
+          <a:p>
+            <a:endParaRPr lang="en-US" sz="1600" b="1"/>
           </a:p>
         </p:txBody>
       </p:sp>
@@ -25246,20 +25322,13 @@
     </p:spTree>
     <p:extLst>
       <p:ext uri="{BB962C8B-B14F-4D97-AF65-F5344CB8AC3E}">
-        <p14:creationId xmlns:p14="http://schemas.microsoft.com/office/powerpoint/2010/main" val="2924514008"/>
+        <p14:creationId xmlns:p14="http://schemas.microsoft.com/office/powerpoint/2010/main" val="718470251"/>
       </p:ext>
     </p:extLst>
   </p:cSld>
   <p:clrMapOvr>
     <a:masterClrMapping/>
   </p:clrMapOvr>
-  <p:timing>
-    <p:tnLst>
-      <p:par>
-        <p:cTn id="1" dur="indefinite" restart="never" nodeType="tmRoot"/>
-      </p:par>
-    </p:tnLst>
-  </p:timing>
 </p:sld>
 </file>
 
@@ -25297,9 +25366,23 @@
           <a:p>
             <a:r>
               <a:rPr lang="en-US" smtClean="0"/>
-              <a:t>Summarising and grouping data</a:t>
-            </a:r>
-            <a:endParaRPr lang="en-US"/>
+              <a:t>5.4 Select columns </a:t>
+            </a:r>
+            <a:r>
+              <a:rPr lang="en-US"/>
+              <a:t>with </a:t>
+            </a:r>
+            <a:r>
+              <a:rPr lang="en-US" smtClean="0">
+                <a:latin typeface="Consolas" panose="020B0609020204030204" pitchFamily="49" charset="0"/>
+                <a:cs typeface="Consolas" panose="020B0609020204030204" pitchFamily="49" charset="0"/>
+              </a:rPr>
+              <a:t>select()</a:t>
+            </a:r>
+            <a:endParaRPr lang="en-US">
+              <a:latin typeface="Consolas" panose="020B0609020204030204" pitchFamily="49" charset="0"/>
+              <a:cs typeface="Consolas" panose="020B0609020204030204" pitchFamily="49" charset="0"/>
+            </a:endParaRPr>
           </a:p>
         </p:txBody>
       </p:sp>
@@ -25319,115 +25402,74 @@
           <a:lstStyle/>
           <a:p>
             <a:r>
-              <a:rPr lang="en-US" i="1" dirty="0" err="1" smtClean="0"/>
-              <a:t>summarise</a:t>
-            </a:r>
-            <a:r>
-              <a:rPr lang="en-US" dirty="0" smtClean="0"/>
-              <a:t> uses </a:t>
-            </a:r>
-            <a:r>
-              <a:rPr lang="en-US" b="1" dirty="0" smtClean="0"/>
-              <a:t>summary functions </a:t>
-            </a:r>
-            <a:r>
-              <a:rPr lang="en-US" dirty="0" smtClean="0"/>
-              <a:t>to create a single value out of a vector (not to be confused with </a:t>
-            </a:r>
-            <a:r>
-              <a:rPr lang="en-US" i="1" dirty="0" smtClean="0"/>
-              <a:t>summary</a:t>
-            </a:r>
-            <a:r>
-              <a:rPr lang="en-US" dirty="0" smtClean="0"/>
-              <a:t> of base R!)</a:t>
-            </a:r>
-          </a:p>
-          <a:p>
-            <a:r>
-              <a:rPr lang="en-US" dirty="0" smtClean="0"/>
-              <a:t>perhaps makes more sense in the</a:t>
-            </a:r>
-            <a:r>
-              <a:rPr lang="en-US" i="1" dirty="0" smtClean="0"/>
-              <a:t> </a:t>
-            </a:r>
-            <a:r>
-              <a:rPr lang="en-US" i="1" dirty="0" err="1" smtClean="0"/>
-              <a:t>summarise_each</a:t>
-            </a:r>
-            <a:r>
-              <a:rPr lang="en-US" i="1" dirty="0" smtClean="0"/>
-              <a:t> </a:t>
-            </a:r>
-            <a:r>
-              <a:rPr lang="en-US" dirty="0" smtClean="0"/>
-              <a:t>version</a:t>
-            </a:r>
-          </a:p>
-          <a:p>
-            <a:r>
-              <a:rPr lang="en-US" dirty="0" smtClean="0"/>
-              <a:t>makes much more sense when combined with grouping:</a:t>
+              <a:rPr lang="en-US" smtClean="0"/>
+              <a:t>The </a:t>
+            </a:r>
+            <a:r>
+              <a:rPr lang="en-US"/>
+              <a:t>first argument is the name of the data frame</a:t>
+            </a:r>
+            <a:r>
+              <a:rPr lang="en-US"/>
+              <a:t>. </a:t>
+            </a:r>
+            <a:r>
+              <a:rPr lang="en-US" smtClean="0"/>
+              <a:t>After that come the names of the columns to select or a more complicated expression:</a:t>
             </a:r>
           </a:p>
           <a:p>
             <a:pPr lvl="1"/>
             <a:r>
-              <a:rPr lang="en-US" i="1" dirty="0" err="1" smtClean="0"/>
-              <a:t>group_by</a:t>
-            </a:r>
-            <a:r>
-              <a:rPr lang="en-US" dirty="0" smtClean="0"/>
-              <a:t> creates a new data frame that is internally split in to parts according to the values of one of the variables (factor, or factor-like)</a:t>
+              <a:rPr lang="en-US" smtClean="0"/>
+              <a:t>a range of columns using :</a:t>
             </a:r>
           </a:p>
           <a:p>
             <a:pPr lvl="1"/>
             <a:r>
-              <a:rPr lang="en-US" i="1" dirty="0" err="1" smtClean="0"/>
-              <a:t>summarise</a:t>
-            </a:r>
-            <a:r>
-              <a:rPr lang="en-US" dirty="0" smtClean="0"/>
-              <a:t> on the grouped data will do the summary </a:t>
-            </a:r>
-            <a:r>
-              <a:rPr lang="en-US" b="1" dirty="0" smtClean="0"/>
-              <a:t>by group!</a:t>
+              <a:rPr lang="en-US" smtClean="0"/>
+              <a:t>"everything but" using -</a:t>
             </a:r>
           </a:p>
           <a:p>
             <a:pPr lvl="1"/>
             <a:r>
-              <a:rPr lang="en-US" dirty="0" smtClean="0"/>
-              <a:t>this is related to </a:t>
-            </a:r>
-            <a:r>
-              <a:rPr lang="en-US" i="1" dirty="0" smtClean="0"/>
-              <a:t>aggregate</a:t>
-            </a:r>
-            <a:r>
-              <a:rPr lang="en-US" dirty="0" smtClean="0"/>
-              <a:t> of base R</a:t>
-            </a:r>
-          </a:p>
-          <a:p>
-            <a:r>
-              <a:rPr lang="en-US" dirty="0" smtClean="0"/>
-              <a:t>grouping also works with the window functions of </a:t>
-            </a:r>
-            <a:r>
-              <a:rPr lang="en-US" i="1" dirty="0" smtClean="0"/>
-              <a:t>transmute</a:t>
+              <a:rPr lang="en-US" smtClean="0"/>
+              <a:t>helper functions that deal with patterns in column names: starts_with, ends_with etc</a:t>
+            </a:r>
+          </a:p>
+          <a:p>
+            <a:r>
+              <a:rPr lang="en-US" smtClean="0">
+                <a:latin typeface="Consolas" panose="020B0609020204030204" pitchFamily="49" charset="0"/>
+                <a:cs typeface="Consolas" panose="020B0609020204030204" pitchFamily="49" charset="0"/>
+              </a:rPr>
+              <a:t>rename() </a:t>
+            </a:r>
+            <a:r>
+              <a:rPr lang="en-US" smtClean="0"/>
+              <a:t>is a variant of </a:t>
+            </a:r>
+            <a:r>
+              <a:rPr lang="en-US">
+                <a:latin typeface="Consolas" panose="020B0609020204030204" pitchFamily="49" charset="0"/>
+                <a:cs typeface="Consolas" panose="020B0609020204030204" pitchFamily="49" charset="0"/>
+              </a:rPr>
+              <a:t>select() </a:t>
+            </a:r>
+            <a:r>
+              <a:rPr lang="en-US" smtClean="0"/>
+              <a:t>for easy renaming of columns</a:t>
             </a:r>
           </a:p>
           <a:p>
             <a:pPr lvl="1"/>
-            <a:r>
-              <a:rPr lang="en-US" dirty="0" smtClean="0"/>
-              <a:t>will do e.g. ranks within the group levels, not in total</a:t>
-            </a:r>
+            <a:endParaRPr lang="en-US" smtClean="0"/>
+          </a:p>
+          <a:p>
+            <a:pPr lvl="1"/>
+            <a:endParaRPr lang="en-US"/>
           </a:p>
         </p:txBody>
       </p:sp>
@@ -25489,20 +25531,13 @@
     </p:spTree>
     <p:extLst>
       <p:ext uri="{BB962C8B-B14F-4D97-AF65-F5344CB8AC3E}">
-        <p14:creationId xmlns:p14="http://schemas.microsoft.com/office/powerpoint/2010/main" val="4277279678"/>
+        <p14:creationId xmlns:p14="http://schemas.microsoft.com/office/powerpoint/2010/main" val="1992223438"/>
       </p:ext>
     </p:extLst>
   </p:cSld>
   <p:clrMapOvr>
     <a:masterClrMapping/>
   </p:clrMapOvr>
-  <p:timing>
-    <p:tnLst>
-      <p:par>
-        <p:cTn id="1" dur="indefinite" restart="never" nodeType="tmRoot"/>
-      </p:par>
-    </p:tnLst>
-  </p:timing>
 </p:sld>
 </file>
 
@@ -25540,7 +25575,7 @@
           <a:p>
             <a:r>
               <a:rPr lang="en-US" smtClean="0"/>
-              <a:t>Pipe</a:t>
+              <a:t>5.4.1 Exercises</a:t>
             </a:r>
             <a:endParaRPr lang="en-US"/>
           </a:p>
@@ -25558,89 +25593,158 @@
         </p:nvSpPr>
         <p:spPr>
           <a:xfrm>
-            <a:off x="609600" y="1600200"/>
-            <a:ext cx="9247321" cy="4525963"/>
+            <a:off x="609600" y="1262130"/>
+            <a:ext cx="10749565" cy="4864033"/>
           </a:xfrm>
         </p:spPr>
         <p:txBody>
           <a:bodyPr/>
           <a:lstStyle/>
           <a:p>
-            <a:r>
-              <a:rPr lang="en-US" smtClean="0"/>
-              <a:t>Piping improves readability of the R code, and also helps simultaneous thinking and writing</a:t>
-            </a:r>
-          </a:p>
-          <a:p>
-            <a:r>
-              <a:rPr lang="en-US" smtClean="0"/>
-              <a:t>Choose between these:</a:t>
-            </a:r>
-          </a:p>
-          <a:p>
-            <a:pPr lvl="1"/>
-            <a:r>
-              <a:rPr lang="en-US" i="1"/>
-              <a:t>iris.new &lt;- mutate(iris,s.area=Sepal.Width*Sepal.Length)</a:t>
+            <a:pPr marL="457200" indent="-457200">
+              <a:buFont typeface="+mj-lt"/>
+              <a:buAutoNum type="arabicPeriod"/>
+            </a:pPr>
+            <a:r>
+              <a:rPr lang="en-US" sz="1600"/>
+              <a:t>Brainstorm as many ways as possible to select dep_time, dep_delay, arr_time, and arr_delay from </a:t>
+            </a:r>
+            <a:r>
+              <a:rPr lang="en-US" sz="1600"/>
+              <a:t>flights</a:t>
+            </a:r>
+            <a:r>
+              <a:rPr lang="en-US" sz="1600" smtClean="0"/>
+              <a:t>.</a:t>
+            </a:r>
+            <a:endParaRPr lang="en-US" sz="1600"/>
+          </a:p>
+          <a:p>
+            <a:pPr marL="457200" indent="-457200">
+              <a:buFont typeface="+mj-lt"/>
+              <a:buAutoNum type="arabicPeriod"/>
+            </a:pPr>
+            <a:r>
+              <a:rPr lang="en-US" sz="1600"/>
+              <a:t>What happens if you include the name of a variable multiple times in a select() </a:t>
+            </a:r>
+            <a:r>
+              <a:rPr lang="en-US" sz="1600"/>
+              <a:t>call</a:t>
+            </a:r>
+            <a:r>
+              <a:rPr lang="en-US" sz="1600" smtClean="0"/>
+              <a:t>?</a:t>
+            </a:r>
+            <a:endParaRPr lang="en-US" sz="1600"/>
+          </a:p>
+          <a:p>
+            <a:pPr marL="457200" indent="-457200">
+              <a:buFont typeface="+mj-lt"/>
+              <a:buAutoNum type="arabicPeriod"/>
+            </a:pPr>
+            <a:r>
+              <a:rPr lang="en-US" sz="1600"/>
+              <a:t>What does the one_of() function do? Why might it be helpful in conjunction with </a:t>
+            </a:r>
+            <a:r>
+              <a:rPr lang="en-US" sz="1600"/>
+              <a:t>this </a:t>
+            </a:r>
+            <a:r>
+              <a:rPr lang="en-US" sz="1600" smtClean="0"/>
+              <a:t>vector?</a:t>
             </a:r>
             <a:br>
-              <a:rPr lang="en-US" i="1"/>
+              <a:rPr lang="en-US" sz="1600" smtClean="0"/>
             </a:br>
             <a:r>
-              <a:rPr lang="en-US" i="1"/>
-              <a:t>filter(iris.new,s.area&lt;15</a:t>
-            </a:r>
-            <a:r>
-              <a:rPr lang="en-US" i="1" smtClean="0"/>
-              <a:t>)</a:t>
-            </a:r>
-          </a:p>
-          <a:p>
-            <a:pPr lvl="1"/>
-            <a:r>
-              <a:rPr lang="en-US" i="1" smtClean="0"/>
-              <a:t>filter(mutate(iris,s.area=Sepal.Width*Sepal.Length),s.area&lt;15)</a:t>
-            </a:r>
-            <a:endParaRPr lang="en-US" i="1"/>
-          </a:p>
-          <a:p>
-            <a:pPr lvl="1"/>
-            <a:r>
-              <a:rPr lang="en-US" i="1" smtClean="0"/>
-              <a:t>mutate(iris,s.area=Sepal.Width*Sepal.Length) %&gt;% </a:t>
+              <a:rPr lang="en-US" sz="1600" smtClean="0"/>
+              <a:t>vars </a:t>
+            </a:r>
+            <a:r>
+              <a:rPr lang="en-US" sz="1600"/>
+              <a:t>&lt;- c("year", "month", "day", "dep_delay", "</a:t>
+            </a:r>
+            <a:r>
+              <a:rPr lang="en-US" sz="1600"/>
+              <a:t>arr_delay</a:t>
+            </a:r>
+            <a:r>
+              <a:rPr lang="en-US" sz="1600" smtClean="0"/>
+              <a:t>")</a:t>
+            </a:r>
+            <a:endParaRPr lang="en-US" sz="1600"/>
+          </a:p>
+          <a:p>
+            <a:pPr marL="457200" indent="-457200">
+              <a:buFont typeface="+mj-lt"/>
+              <a:buAutoNum type="arabicPeriod"/>
+            </a:pPr>
+            <a:r>
+              <a:rPr lang="en-US" sz="1600"/>
+              <a:t>Does the result of running the following code surprise you? How do the select helpers deal with case by default? How can you change </a:t>
+            </a:r>
+            <a:r>
+              <a:rPr lang="en-US" sz="1600"/>
+              <a:t>that </a:t>
+            </a:r>
+            <a:r>
+              <a:rPr lang="en-US" sz="1600" smtClean="0"/>
+              <a:t>default? </a:t>
             </a:r>
             <a:br>
-              <a:rPr lang="en-US" i="1" smtClean="0"/>
+              <a:rPr lang="en-US" sz="1600" smtClean="0"/>
             </a:br>
             <a:r>
-              <a:rPr lang="en-US" i="1" smtClean="0"/>
-              <a:t>filter(s.area&lt;15)</a:t>
-            </a:r>
-          </a:p>
-          <a:p>
-            <a:r>
-              <a:rPr lang="en-US" smtClean="0"/>
-              <a:t>the result on the left becomes the first argument on the right:</a:t>
+              <a:rPr lang="en-US" sz="1600" smtClean="0"/>
+              <a:t>select(flights</a:t>
+            </a:r>
+            <a:r>
+              <a:rPr lang="en-US" sz="1600"/>
+              <a:t>, contains("TIME"))</a:t>
+            </a:r>
+          </a:p>
+          <a:p>
+            <a:pPr marL="457200" indent="-457200">
+              <a:buFont typeface="+mj-lt"/>
+              <a:buAutoNum type="arabicPeriod"/>
+            </a:pPr>
+            <a:endParaRPr lang="en-US" sz="1600"/>
+          </a:p>
+          <a:p>
+            <a:r>
+              <a:rPr lang="en-US" sz="1600" smtClean="0">
+                <a:latin typeface="Corbel" panose="020B0503020204020204" pitchFamily="34" charset="0"/>
+                <a:cs typeface="Consolas" panose="020B0609020204030204" pitchFamily="49" charset="0"/>
+              </a:rPr>
+              <a:t>Suggested </a:t>
+            </a:r>
+            <a:r>
+              <a:rPr lang="en-US" sz="1600">
+                <a:latin typeface="Corbel" panose="020B0503020204020204" pitchFamily="34" charset="0"/>
+                <a:cs typeface="Consolas" panose="020B0609020204030204" pitchFamily="49" charset="0"/>
+              </a:rPr>
+              <a:t>order/importance</a:t>
+            </a:r>
+            <a:r>
+              <a:rPr lang="en-US" sz="1600" smtClean="0">
+                <a:latin typeface="Corbel" panose="020B0503020204020204" pitchFamily="34" charset="0"/>
+                <a:cs typeface="Consolas" panose="020B0609020204030204" pitchFamily="49" charset="0"/>
+              </a:rPr>
+              <a:t>: 1 and 2 mainly</a:t>
+            </a:r>
+            <a:r>
+              <a:rPr lang="en-US" sz="1600" b="1" smtClean="0"/>
+              <a:t/>
             </a:r>
             <a:br>
-              <a:rPr lang="en-US" smtClean="0"/>
+              <a:rPr lang="en-US" sz="1600" b="1" smtClean="0"/>
             </a:br>
-            <a:r>
-              <a:rPr lang="en-US" i="1"/>
-              <a:t>firstfun(x) %&gt;% </a:t>
-            </a:r>
-            <a:r>
-              <a:rPr lang="en-US" i="1" smtClean="0"/>
-              <a:t>secondfun(y) </a:t>
-            </a:r>
-            <a:r>
-              <a:rPr lang="en-US"/>
-              <a:t>is the same as </a:t>
-            </a:r>
-            <a:r>
-              <a:rPr lang="en-US" i="1" smtClean="0"/>
-              <a:t>secondfun(firstfun(x),y)</a:t>
-            </a:r>
+            <a:endParaRPr lang="en-US" sz="1600" b="1" smtClean="0"/>
+          </a:p>
+          <a:p>
+            <a:endParaRPr lang="en-US" sz="1600" b="1"/>
           </a:p>
         </p:txBody>
       </p:sp>
@@ -25702,20 +25806,13 @@
     </p:spTree>
     <p:extLst>
       <p:ext uri="{BB962C8B-B14F-4D97-AF65-F5344CB8AC3E}">
-        <p14:creationId xmlns:p14="http://schemas.microsoft.com/office/powerpoint/2010/main" val="1368817280"/>
+        <p14:creationId xmlns:p14="http://schemas.microsoft.com/office/powerpoint/2010/main" val="1840055725"/>
       </p:ext>
     </p:extLst>
   </p:cSld>
   <p:clrMapOvr>
     <a:masterClrMapping/>
   </p:clrMapOvr>
-  <p:timing>
-    <p:tnLst>
-      <p:par>
-        <p:cTn id="1" dur="indefinite" restart="never" nodeType="tmRoot"/>
-      </p:par>
-    </p:tnLst>
-  </p:timing>
 </p:sld>
 </file>
 
@@ -25753,9 +25850,27 @@
           <a:p>
             <a:r>
               <a:rPr lang="en-US" smtClean="0"/>
-              <a:t>Tidy data</a:t>
-            </a:r>
-            <a:endParaRPr lang="en-US"/>
+              <a:t>5.5 </a:t>
+            </a:r>
+            <a:r>
+              <a:rPr lang="en-US"/>
+              <a:t>Add new variables </a:t>
+            </a:r>
+            <a:r>
+              <a:rPr lang="en-US"/>
+              <a:t>with </a:t>
+            </a:r>
+            <a:r>
+              <a:rPr lang="en-US" smtClean="0">
+                <a:latin typeface="Consolas" panose="020B0609020204030204" pitchFamily="49" charset="0"/>
+                <a:cs typeface="Consolas" panose="020B0609020204030204" pitchFamily="49" charset="0"/>
+              </a:rPr>
+              <a:t>mutate()</a:t>
+            </a:r>
+            <a:endParaRPr lang="en-US">
+              <a:latin typeface="Consolas" panose="020B0609020204030204" pitchFamily="49" charset="0"/>
+              <a:cs typeface="Consolas" panose="020B0609020204030204" pitchFamily="49" charset="0"/>
+            </a:endParaRPr>
           </a:p>
         </p:txBody>
       </p:sp>
@@ -25775,108 +25890,36 @@
           <a:lstStyle/>
           <a:p>
             <a:r>
-              <a:rPr lang="en-US" dirty="0" smtClean="0"/>
-              <a:t>Please also read through the vignette of </a:t>
-            </a:r>
-            <a:r>
-              <a:rPr lang="en-US" i="1" dirty="0" err="1" smtClean="0"/>
-              <a:t>tidyr</a:t>
-            </a:r>
-            <a:r>
-              <a:rPr lang="en-US" dirty="0" smtClean="0"/>
-              <a:t> package and/or the JSS article</a:t>
-            </a:r>
-          </a:p>
-          <a:p>
-            <a:r>
-              <a:rPr lang="en-US" dirty="0" smtClean="0"/>
-              <a:t>The short version:</a:t>
-            </a:r>
-          </a:p>
-          <a:p>
-            <a:pPr lvl="1"/>
-            <a:r>
-              <a:rPr lang="en-US" dirty="0" smtClean="0"/>
-              <a:t>you want single columns to be single variables</a:t>
-            </a:r>
-          </a:p>
-          <a:p>
-            <a:pPr lvl="1"/>
-            <a:r>
-              <a:rPr lang="en-US" dirty="0" smtClean="0"/>
-              <a:t>you want single rows to be single observations</a:t>
-            </a:r>
-          </a:p>
-          <a:p>
-            <a:pPr lvl="1"/>
-            <a:r>
-              <a:rPr lang="en-US" dirty="0" smtClean="0"/>
-              <a:t>(you want one type of data in one table)</a:t>
-            </a:r>
-          </a:p>
-          <a:p>
-            <a:r>
-              <a:rPr lang="en-US" dirty="0" smtClean="0"/>
-              <a:t>All of </a:t>
-            </a:r>
-            <a:r>
-              <a:rPr lang="en-US" i="1" dirty="0" err="1" smtClean="0"/>
-              <a:t>tidyverse</a:t>
-            </a:r>
-            <a:r>
-              <a:rPr lang="en-US" dirty="0" smtClean="0"/>
-              <a:t> </a:t>
-            </a:r>
-            <a:r>
               <a:rPr lang="en-US" smtClean="0"/>
-              <a:t>(</a:t>
-            </a:r>
-            <a:r>
-              <a:rPr lang="en-US" i="1" smtClean="0"/>
-              <a:t>ggplot2</a:t>
+              <a:t>The </a:t>
+            </a:r>
+            <a:r>
+              <a:rPr lang="en-US"/>
+              <a:t>first argument is the name of the data frame</a:t>
+            </a:r>
+            <a:r>
+              <a:rPr lang="en-US"/>
+              <a:t>. </a:t>
             </a:r>
             <a:r>
               <a:rPr lang="en-US" smtClean="0"/>
-              <a:t> </a:t>
-            </a:r>
-            <a:r>
-              <a:rPr lang="en-US" dirty="0" smtClean="0"/>
-              <a:t>in particular) relies on this idea</a:t>
-            </a:r>
-          </a:p>
-          <a:p>
-            <a:pPr lvl="1"/>
-            <a:r>
-              <a:rPr lang="en-US" dirty="0" smtClean="0"/>
-              <a:t>but some other packages / software might not, and you have to deal with this</a:t>
-            </a:r>
-          </a:p>
-          <a:p>
-            <a:r>
-              <a:rPr lang="en-US" dirty="0" smtClean="0"/>
-              <a:t>The relevant functions are </a:t>
-            </a:r>
-            <a:r>
-              <a:rPr lang="en-US" i="1" dirty="0" smtClean="0"/>
-              <a:t>gather</a:t>
-            </a:r>
-            <a:r>
-              <a:rPr lang="en-US" dirty="0" smtClean="0"/>
-              <a:t> and </a:t>
-            </a:r>
-            <a:r>
-              <a:rPr lang="en-US" i="1" dirty="0" smtClean="0"/>
-              <a:t>spread</a:t>
-            </a:r>
-            <a:r>
-              <a:rPr lang="en-US" dirty="0" smtClean="0"/>
-              <a:t>, and </a:t>
-            </a:r>
-            <a:r>
-              <a:rPr lang="en-US" i="1" dirty="0" smtClean="0"/>
-              <a:t>separate</a:t>
-            </a:r>
-            <a:endParaRPr lang="en-US" i="1" dirty="0"/>
+              <a:t>After that come the names of the new columns and how to create them</a:t>
+            </a:r>
+          </a:p>
+          <a:p>
+            <a:r>
+              <a:rPr lang="en-US" smtClean="0"/>
+              <a:t>All the arithmetic and math you can think of is in use!</a:t>
+            </a:r>
+          </a:p>
+          <a:p>
+            <a:r>
+              <a:rPr lang="en-US" smtClean="0"/>
+              <a:t>Also all kinds of ranks, lags, lead, cumulative sums...</a:t>
+            </a:r>
+          </a:p>
+          <a:p>
+            <a:endParaRPr lang="en-US" smtClean="0"/>
           </a:p>
         </p:txBody>
       </p:sp>
@@ -25938,20 +25981,13 @@
     </p:spTree>
     <p:extLst>
       <p:ext uri="{BB962C8B-B14F-4D97-AF65-F5344CB8AC3E}">
-        <p14:creationId xmlns:p14="http://schemas.microsoft.com/office/powerpoint/2010/main" val="915466383"/>
+        <p14:creationId xmlns:p14="http://schemas.microsoft.com/office/powerpoint/2010/main" val="1381927984"/>
       </p:ext>
     </p:extLst>
   </p:cSld>
   <p:clrMapOvr>
     <a:masterClrMapping/>
   </p:clrMapOvr>
-  <p:timing>
-    <p:tnLst>
-      <p:par>
-        <p:cTn id="1" dur="indefinite" restart="never" nodeType="tmRoot"/>
-      </p:par>
-    </p:tnLst>
-  </p:timing>
 </p:sld>
 </file>
 
@@ -25989,7 +26025,7 @@
           <a:p>
             <a:r>
               <a:rPr lang="en-US" smtClean="0"/>
-              <a:t>Combining data sets</a:t>
+              <a:t>5.4.1 Exercises</a:t>
             </a:r>
             <a:endParaRPr lang="en-US"/>
           </a:p>
@@ -26005,75 +26041,115 @@
             <p:ph idx="1"/>
           </p:nvPr>
         </p:nvSpPr>
-        <p:spPr/>
+        <p:spPr>
+          <a:xfrm>
+            <a:off x="609600" y="1262130"/>
+            <a:ext cx="10749565" cy="4864033"/>
+          </a:xfrm>
+        </p:spPr>
         <p:txBody>
           <a:bodyPr/>
           <a:lstStyle/>
           <a:p>
-            <a:r>
-              <a:rPr lang="en-US" dirty="0" smtClean="0"/>
-              <a:t>When you have two data frames with one (or more) common variable, and you need to combine the data from the two sets, matching the common variable, use one of the </a:t>
-            </a:r>
-            <a:r>
-              <a:rPr lang="en-US" i="1" dirty="0" smtClean="0"/>
-              <a:t>join</a:t>
-            </a:r>
-            <a:r>
-              <a:rPr lang="en-US" dirty="0" smtClean="0"/>
-              <a:t> functions (left, right, inner or full)</a:t>
-            </a:r>
-          </a:p>
-          <a:p>
-            <a:pPr lvl="1"/>
-            <a:r>
-              <a:rPr lang="en-US" dirty="0" smtClean="0"/>
-              <a:t>or </a:t>
-            </a:r>
-            <a:r>
-              <a:rPr lang="en-US" i="1" dirty="0" smtClean="0"/>
-              <a:t>merge</a:t>
-            </a:r>
-            <a:r>
-              <a:rPr lang="en-US" dirty="0" smtClean="0"/>
-              <a:t> from the base R</a:t>
-            </a:r>
-          </a:p>
-          <a:p>
-            <a:pPr lvl="1"/>
-            <a:r>
-              <a:rPr lang="en-US" dirty="0" smtClean="0"/>
-              <a:t>the versions differ in what they do in case there are unmatched values</a:t>
-            </a:r>
-          </a:p>
-          <a:p>
-            <a:r>
-              <a:rPr lang="en-US" dirty="0" smtClean="0"/>
-              <a:t>When you have two data frames with the same variables (columns), you can stick them together with </a:t>
-            </a:r>
-            <a:r>
-              <a:rPr lang="en-US" i="1" dirty="0" err="1" smtClean="0"/>
-              <a:t>bind_rows</a:t>
-            </a:r>
-            <a:endParaRPr lang="en-US" i="1" dirty="0" smtClean="0"/>
-          </a:p>
-          <a:p>
-            <a:pPr lvl="1"/>
-            <a:r>
-              <a:rPr lang="en-US" dirty="0" smtClean="0"/>
-              <a:t>note that the columns need not be in the same order</a:t>
-            </a:r>
-          </a:p>
-          <a:p>
-            <a:pPr lvl="1"/>
-            <a:r>
-              <a:rPr lang="en-US" i="1" dirty="0" err="1" smtClean="0"/>
-              <a:t>bind_cols</a:t>
-            </a:r>
-            <a:r>
-              <a:rPr lang="en-US" dirty="0" smtClean="0"/>
-              <a:t> also exists, but maybe join is what you actually need in that case?</a:t>
-            </a:r>
-            <a:endParaRPr lang="en-US" dirty="0"/>
+            <a:pPr marL="457200" indent="-457200">
+              <a:buFont typeface="+mj-lt"/>
+              <a:buAutoNum type="arabicPeriod"/>
+            </a:pPr>
+            <a:r>
+              <a:rPr lang="en-US" sz="1600"/>
+              <a:t>Currently dep_time and sched_dep_time are convenient to look at, but hard to compute with because they’re not really continuous numbers. Convert them to a more convenient representation of number of minutes since midnight.</a:t>
+            </a:r>
+          </a:p>
+          <a:p>
+            <a:pPr marL="457200" indent="-457200">
+              <a:buFont typeface="+mj-lt"/>
+              <a:buAutoNum type="arabicPeriod"/>
+            </a:pPr>
+            <a:r>
+              <a:rPr lang="en-US" sz="1600"/>
+              <a:t>Compare air_time with arr_time - dep_time. What do you expect to see? What do you see? What do you need to do to fix it?</a:t>
+            </a:r>
+          </a:p>
+          <a:p>
+            <a:pPr marL="457200" indent="-457200">
+              <a:buFont typeface="+mj-lt"/>
+              <a:buAutoNum type="arabicPeriod"/>
+            </a:pPr>
+            <a:r>
+              <a:rPr lang="en-US" sz="1600"/>
+              <a:t>Compare dep_time, sched_dep_time, and dep_delay. How would you expect those three numbers to be related?</a:t>
+            </a:r>
+          </a:p>
+          <a:p>
+            <a:pPr marL="457200" indent="-457200">
+              <a:buFont typeface="+mj-lt"/>
+              <a:buAutoNum type="arabicPeriod"/>
+            </a:pPr>
+            <a:r>
+              <a:rPr lang="en-US" sz="1600"/>
+              <a:t>Find the 10 most delayed flights using a ranking function. How do you want to handle ties? Carefully read the documentation for min_rank().</a:t>
+            </a:r>
+          </a:p>
+          <a:p>
+            <a:pPr marL="457200" indent="-457200">
+              <a:buFont typeface="+mj-lt"/>
+              <a:buAutoNum type="arabicPeriod"/>
+            </a:pPr>
+            <a:r>
+              <a:rPr lang="en-US" sz="1600"/>
+              <a:t>What does 1:3 + 1:10 return? Why?</a:t>
+            </a:r>
+          </a:p>
+          <a:p>
+            <a:pPr marL="457200" indent="-457200">
+              <a:buFont typeface="+mj-lt"/>
+              <a:buAutoNum type="arabicPeriod"/>
+            </a:pPr>
+            <a:r>
+              <a:rPr lang="en-US" sz="1600"/>
+              <a:t>What trigonometric functions does R provide?</a:t>
+            </a:r>
+          </a:p>
+          <a:p>
+            <a:pPr marL="457200" indent="-457200">
+              <a:buFont typeface="+mj-lt"/>
+              <a:buAutoNum type="arabicPeriod"/>
+            </a:pPr>
+            <a:endParaRPr lang="en-US" sz="1600"/>
+          </a:p>
+          <a:p>
+            <a:r>
+              <a:rPr lang="en-US" sz="1600" smtClean="0">
+                <a:latin typeface="Corbel" panose="020B0503020204020204" pitchFamily="34" charset="0"/>
+                <a:cs typeface="Consolas" panose="020B0609020204030204" pitchFamily="49" charset="0"/>
+              </a:rPr>
+              <a:t>Suggested </a:t>
+            </a:r>
+            <a:r>
+              <a:rPr lang="en-US" sz="1600">
+                <a:latin typeface="Corbel" panose="020B0503020204020204" pitchFamily="34" charset="0"/>
+                <a:cs typeface="Consolas" panose="020B0609020204030204" pitchFamily="49" charset="0"/>
+              </a:rPr>
+              <a:t>order/importance</a:t>
+            </a:r>
+            <a:r>
+              <a:rPr lang="en-US" sz="1600" smtClean="0">
+                <a:latin typeface="Corbel" panose="020B0503020204020204" pitchFamily="34" charset="0"/>
+                <a:cs typeface="Consolas" panose="020B0609020204030204" pitchFamily="49" charset="0"/>
+              </a:rPr>
+              <a:t>: 1, 2 and 3 mainly</a:t>
+            </a:r>
+            <a:r>
+              <a:rPr lang="en-US" sz="1600" b="1" smtClean="0"/>
+              <a:t/>
+            </a:r>
+            <a:br>
+              <a:rPr lang="en-US" sz="1600" b="1" smtClean="0"/>
+            </a:br>
+            <a:endParaRPr lang="en-US" sz="1600" b="1" smtClean="0"/>
+          </a:p>
+          <a:p>
+            <a:endParaRPr lang="en-US" sz="1600" b="1"/>
           </a:p>
         </p:txBody>
       </p:sp>
@@ -26135,20 +26211,13 @@
     </p:spTree>
     <p:extLst>
       <p:ext uri="{BB962C8B-B14F-4D97-AF65-F5344CB8AC3E}">
-        <p14:creationId xmlns:p14="http://schemas.microsoft.com/office/powerpoint/2010/main" val="434757249"/>
+        <p14:creationId xmlns:p14="http://schemas.microsoft.com/office/powerpoint/2010/main" val="163977682"/>
       </p:ext>
     </p:extLst>
   </p:cSld>
   <p:clrMapOvr>
     <a:masterClrMapping/>
   </p:clrMapOvr>
-  <p:timing>
-    <p:tnLst>
-      <p:par>
-        <p:cTn id="1" dur="indefinite" restart="never" nodeType="tmRoot"/>
-      </p:par>
-    </p:tnLst>
-  </p:timing>
 </p:sld>
 </file>
 
@@ -26171,12 +26240,12 @@
       </p:grpSpPr>
       <p:sp>
         <p:nvSpPr>
-          <p:cNvPr id="2" name="Text Placeholder 1"/>
+          <p:cNvPr id="2" name="Title 1"/>
           <p:cNvSpPr>
             <a:spLocks noGrp="1"/>
           </p:cNvSpPr>
           <p:nvPr>
-            <p:ph type="body" sz="quarter" idx="10"/>
+            <p:ph type="title"/>
           </p:nvPr>
         </p:nvSpPr>
         <p:spPr/>
@@ -26186,65 +26255,886 @@
           <a:p>
             <a:r>
               <a:rPr lang="en-US" smtClean="0"/>
-              <a:t>Seija Sirkiä</a:t>
-            </a:r>
-            <a:endParaRPr lang="en-US"/>
-          </a:p>
-        </p:txBody>
-      </p:sp>
-      <p:sp>
-        <p:nvSpPr>
-          <p:cNvPr id="4" name="Text Placeholder 3"/>
+              <a:t>5.6 Grouped summaries </a:t>
+            </a:r>
+            <a:r>
+              <a:rPr lang="en-US"/>
+              <a:t>with </a:t>
+            </a:r>
+            <a:r>
+              <a:rPr lang="en-US" smtClean="0">
+                <a:latin typeface="Consolas" panose="020B0609020204030204" pitchFamily="49" charset="0"/>
+                <a:cs typeface="Consolas" panose="020B0609020204030204" pitchFamily="49" charset="0"/>
+              </a:rPr>
+              <a:t>summarise()</a:t>
+            </a:r>
+            <a:endParaRPr lang="en-US">
+              <a:latin typeface="Consolas" panose="020B0609020204030204" pitchFamily="49" charset="0"/>
+              <a:cs typeface="Consolas" panose="020B0609020204030204" pitchFamily="49" charset="0"/>
+            </a:endParaRPr>
+          </a:p>
+        </p:txBody>
+      </p:sp>
+      <p:sp>
+        <p:nvSpPr>
+          <p:cNvPr id="3" name="Content Placeholder 2"/>
           <p:cNvSpPr>
             <a:spLocks noGrp="1"/>
           </p:cNvSpPr>
           <p:nvPr>
-            <p:ph type="body" sz="quarter" idx="12"/>
+            <p:ph idx="1"/>
           </p:nvPr>
         </p:nvSpPr>
-        <p:spPr>
-          <a:xfrm>
-            <a:off x="3072903" y="4315527"/>
-            <a:ext cx="2735469" cy="1717210"/>
-          </a:xfrm>
-        </p:spPr>
+        <p:spPr/>
         <p:txBody>
           <a:bodyPr/>
           <a:lstStyle/>
           <a:p>
             <a:r>
               <a:rPr lang="en-US" smtClean="0"/>
-              <a:t>PhD, data scientist, application specialist</a:t>
-            </a:r>
-          </a:p>
-          <a:p>
-            <a:endParaRPr lang="en-US"/>
+              <a:t>On its own collapses the whole data frame in to a single result of one function taken on a single column - not very useful!</a:t>
+            </a:r>
           </a:p>
           <a:p>
             <a:r>
               <a:rPr lang="en-US" smtClean="0"/>
-              <a:t>seija.sirkia@csc.fi</a:t>
-            </a:r>
-            <a:endParaRPr lang="en-US"/>
-          </a:p>
-        </p:txBody>
-      </p:sp>
-      <p:sp>
-        <p:nvSpPr>
-          <p:cNvPr id="6" name="Picture Placeholder 5"/>
+              <a:t>Together with </a:t>
+            </a:r>
+            <a:r>
+              <a:rPr lang="en-US" smtClean="0">
+                <a:latin typeface="Consolas" panose="020B0609020204030204" pitchFamily="49" charset="0"/>
+                <a:cs typeface="Consolas" panose="020B0609020204030204" pitchFamily="49" charset="0"/>
+              </a:rPr>
+              <a:t>group_by() </a:t>
+            </a:r>
+            <a:r>
+              <a:rPr lang="en-US" smtClean="0">
+                <a:latin typeface="Corbel" panose="020B0503020204020204" pitchFamily="34" charset="0"/>
+                <a:cs typeface="Consolas" panose="020B0609020204030204" pitchFamily="49" charset="0"/>
+              </a:rPr>
+              <a:t>calculates the function by group - really useful!</a:t>
+            </a:r>
+          </a:p>
+          <a:p>
+            <a:r>
+              <a:rPr lang="en-US">
+                <a:latin typeface="Consolas" panose="020B0609020204030204" pitchFamily="49" charset="0"/>
+                <a:cs typeface="Consolas" panose="020B0609020204030204" pitchFamily="49" charset="0"/>
+              </a:rPr>
+              <a:t>group_by</a:t>
+            </a:r>
+            <a:r>
+              <a:rPr lang="en-US" smtClean="0">
+                <a:latin typeface="Consolas" panose="020B0609020204030204" pitchFamily="49" charset="0"/>
+                <a:cs typeface="Consolas" panose="020B0609020204030204" pitchFamily="49" charset="0"/>
+              </a:rPr>
+              <a:t>()</a:t>
+            </a:r>
+            <a:r>
+              <a:rPr lang="en-US">
+                <a:cs typeface="Consolas" panose="020B0609020204030204" pitchFamily="49" charset="0"/>
+              </a:rPr>
+              <a:t> </a:t>
+            </a:r>
+            <a:r>
+              <a:rPr lang="en-US" smtClean="0">
+                <a:cs typeface="Consolas" panose="020B0609020204030204" pitchFamily="49" charset="0"/>
+              </a:rPr>
+              <a:t>does work with more than one grouping variable</a:t>
+            </a:r>
+          </a:p>
+          <a:p>
+            <a:r>
+              <a:rPr lang="en-US" smtClean="0">
+                <a:latin typeface="Corbel" panose="020B0503020204020204" pitchFamily="34" charset="0"/>
+                <a:cs typeface="Consolas" panose="020B0609020204030204" pitchFamily="49" charset="0"/>
+              </a:rPr>
+              <a:t>Occasionally you might want to </a:t>
+            </a:r>
+            <a:r>
+              <a:rPr lang="en-US" smtClean="0">
+                <a:latin typeface="Consolas" panose="020B0609020204030204" pitchFamily="49" charset="0"/>
+                <a:cs typeface="Consolas" panose="020B0609020204030204" pitchFamily="49" charset="0"/>
+              </a:rPr>
+              <a:t>ungroup()</a:t>
+            </a:r>
+            <a:r>
+              <a:rPr lang="en-US" smtClean="0">
+                <a:latin typeface="Corbel" panose="020B0503020204020204" pitchFamily="34" charset="0"/>
+                <a:cs typeface="Consolas" panose="020B0609020204030204" pitchFamily="49" charset="0"/>
+              </a:rPr>
+              <a:t> afterwards</a:t>
+            </a:r>
+            <a:r>
+              <a:rPr lang="en-US" smtClean="0">
+                <a:latin typeface="Consolas" panose="020B0609020204030204" pitchFamily="49" charset="0"/>
+                <a:cs typeface="Consolas" panose="020B0609020204030204" pitchFamily="49" charset="0"/>
+              </a:rPr>
+              <a:t> </a:t>
+            </a:r>
+            <a:endParaRPr lang="en-US" smtClean="0">
+              <a:latin typeface="Corbel" panose="020B0503020204020204" pitchFamily="34" charset="0"/>
+              <a:cs typeface="Consolas" panose="020B0609020204030204" pitchFamily="49" charset="0"/>
+            </a:endParaRPr>
+          </a:p>
+          <a:p>
+            <a:endParaRPr lang="en-US" smtClean="0">
+              <a:latin typeface="Consolas" panose="020B0609020204030204" pitchFamily="49" charset="0"/>
+              <a:cs typeface="Consolas" panose="020B0609020204030204" pitchFamily="49" charset="0"/>
+            </a:endParaRPr>
+          </a:p>
+        </p:txBody>
+      </p:sp>
+      <p:sp>
+        <p:nvSpPr>
+          <p:cNvPr id="4" name="Date Placeholder 3"/>
           <p:cNvSpPr>
             <a:spLocks noGrp="1"/>
           </p:cNvSpPr>
           <p:nvPr>
-            <p:ph type="pic" sz="quarter" idx="11"/>
+            <p:ph type="dt" sz="half" idx="10"/>
           </p:nvPr>
         </p:nvSpPr>
         <p:spPr/>
+        <p:txBody>
+          <a:bodyPr/>
+          <a:lstStyle/>
+          <a:p>
+            <a:pPr>
+              <a:defRPr/>
+            </a:pPr>
+            <a:r>
+              <a:rPr lang="fi-FI" smtClean="0"/>
+              <a:t>2017-03-08</a:t>
+            </a:r>
+            <a:endParaRPr lang="en-US"/>
+          </a:p>
+        </p:txBody>
+      </p:sp>
+      <p:sp>
+        <p:nvSpPr>
+          <p:cNvPr id="5" name="Slide Number Placeholder 4"/>
+          <p:cNvSpPr>
+            <a:spLocks noGrp="1"/>
+          </p:cNvSpPr>
+          <p:nvPr>
+            <p:ph type="sldNum" sz="quarter" idx="12"/>
+          </p:nvPr>
+        </p:nvSpPr>
+        <p:spPr/>
+        <p:txBody>
+          <a:bodyPr/>
+          <a:lstStyle/>
+          <a:p>
+            <a:pPr>
+              <a:defRPr/>
+            </a:pPr>
+            <a:fld id="{2BC46539-7FEE-8846-9EF1-6D13C0293C6C}" type="slidenum">
+              <a:rPr lang="en-US" smtClean="0"/>
+              <a:pPr>
+                <a:defRPr/>
+              </a:pPr>
+              <a:t>26</a:t>
+            </a:fld>
+            <a:endParaRPr lang="en-US"/>
+          </a:p>
+        </p:txBody>
       </p:sp>
     </p:spTree>
     <p:extLst>
       <p:ext uri="{BB962C8B-B14F-4D97-AF65-F5344CB8AC3E}">
-        <p14:creationId xmlns:p14="http://schemas.microsoft.com/office/powerpoint/2010/main" val="2061839335"/>
+        <p14:creationId xmlns:p14="http://schemas.microsoft.com/office/powerpoint/2010/main" val="1203859242"/>
+      </p:ext>
+    </p:extLst>
+  </p:cSld>
+  <p:clrMapOvr>
+    <a:masterClrMapping/>
+  </p:clrMapOvr>
+</p:sld>
+</file>
+
+<file path=ppt/slides/slide27.xml><?xml version="1.0" encoding="utf-8"?>
+<p:sld xmlns:a="http://schemas.openxmlformats.org/drawingml/2006/main" xmlns:r="http://schemas.openxmlformats.org/officeDocument/2006/relationships" xmlns:p="http://schemas.openxmlformats.org/presentationml/2006/main">
+  <p:cSld>
+    <p:spTree>
+      <p:nvGrpSpPr>
+        <p:cNvPr id="1" name=""/>
+        <p:cNvGrpSpPr/>
+        <p:nvPr/>
+      </p:nvGrpSpPr>
+      <p:grpSpPr>
+        <a:xfrm>
+          <a:off x="0" y="0"/>
+          <a:ext cx="0" cy="0"/>
+          <a:chOff x="0" y="0"/>
+          <a:chExt cx="0" cy="0"/>
+        </a:xfrm>
+      </p:grpSpPr>
+      <p:sp>
+        <p:nvSpPr>
+          <p:cNvPr id="2" name="Title 1"/>
+          <p:cNvSpPr>
+            <a:spLocks noGrp="1"/>
+          </p:cNvSpPr>
+          <p:nvPr>
+            <p:ph type="title"/>
+          </p:nvPr>
+        </p:nvSpPr>
+        <p:spPr/>
+        <p:txBody>
+          <a:bodyPr/>
+          <a:lstStyle/>
+          <a:p>
+            <a:r>
+              <a:rPr lang="en-US" smtClean="0"/>
+              <a:t>5.6.1 Combining </a:t>
+            </a:r>
+            <a:r>
+              <a:rPr lang="en-US"/>
+              <a:t>multiple operations with the pipe</a:t>
+            </a:r>
+          </a:p>
+        </p:txBody>
+      </p:sp>
+      <p:sp>
+        <p:nvSpPr>
+          <p:cNvPr id="3" name="Content Placeholder 2"/>
+          <p:cNvSpPr>
+            <a:spLocks noGrp="1"/>
+          </p:cNvSpPr>
+          <p:nvPr>
+            <p:ph idx="1"/>
+          </p:nvPr>
+        </p:nvSpPr>
+        <p:spPr>
+          <a:xfrm>
+            <a:off x="609601" y="1600200"/>
+            <a:ext cx="9281374" cy="4525963"/>
+          </a:xfrm>
+        </p:spPr>
+        <p:txBody>
+          <a:bodyPr/>
+          <a:lstStyle/>
+          <a:p>
+            <a:r>
+              <a:rPr lang="en-US"/>
+              <a:t>Piping improves readability of the R code, and also helps simultaneous thinking </a:t>
+            </a:r>
+            <a:r>
+              <a:rPr lang="en-US"/>
+              <a:t>and </a:t>
+            </a:r>
+            <a:r>
+              <a:rPr lang="en-US" smtClean="0"/>
+              <a:t>writing. Read it as "and then".</a:t>
+            </a:r>
+            <a:endParaRPr lang="en-US"/>
+          </a:p>
+          <a:p>
+            <a:r>
+              <a:rPr lang="en-US"/>
+              <a:t>the result on the left becomes the first argument on the right:</a:t>
+            </a:r>
+            <a:br>
+              <a:rPr lang="en-US"/>
+            </a:br>
+            <a:r>
+              <a:rPr lang="en-US" i="1"/>
+              <a:t>firstfun(x) %&gt;% secondfun(y) </a:t>
+            </a:r>
+            <a:r>
+              <a:rPr lang="en-US"/>
+              <a:t>is the same as </a:t>
+            </a:r>
+            <a:r>
+              <a:rPr lang="en-US" i="1"/>
+              <a:t>secondfun(firstfun(x),</a:t>
+            </a:r>
+            <a:r>
+              <a:rPr lang="en-US" i="1"/>
+              <a:t>y</a:t>
+            </a:r>
+            <a:r>
+              <a:rPr lang="en-US" i="1" smtClean="0"/>
+              <a:t>)</a:t>
+            </a:r>
+            <a:endParaRPr lang="en-US">
+              <a:latin typeface="Consolas" panose="020B0609020204030204" pitchFamily="49" charset="0"/>
+              <a:cs typeface="Consolas" panose="020B0609020204030204" pitchFamily="49" charset="0"/>
+            </a:endParaRPr>
+          </a:p>
+          <a:p>
+            <a:r>
+              <a:rPr lang="en-US" smtClean="0">
+                <a:latin typeface="Corbel" panose="020B0503020204020204" pitchFamily="34" charset="0"/>
+              </a:rPr>
+              <a:t>If you know the Linux/UNIX pipe, this is basically the same thing</a:t>
+            </a:r>
+          </a:p>
+          <a:p>
+            <a:r>
+              <a:rPr lang="en-US" smtClean="0">
+                <a:latin typeface="Corbel" panose="020B0503020204020204" pitchFamily="34" charset="0"/>
+              </a:rPr>
+              <a:t>If you know your math, this is exactly the same thing as function composition</a:t>
+            </a:r>
+          </a:p>
+          <a:p>
+            <a:r>
+              <a:rPr lang="en-US" smtClean="0">
+                <a:latin typeface="Corbel" panose="020B0503020204020204" pitchFamily="34" charset="0"/>
+              </a:rPr>
+              <a:t>Shift + Ctrl + M is the keyboard shortcut</a:t>
+            </a:r>
+            <a:endParaRPr lang="en-US">
+              <a:latin typeface="Corbel" panose="020B0503020204020204" pitchFamily="34" charset="0"/>
+            </a:endParaRPr>
+          </a:p>
+        </p:txBody>
+      </p:sp>
+      <p:sp>
+        <p:nvSpPr>
+          <p:cNvPr id="4" name="Date Placeholder 3"/>
+          <p:cNvSpPr>
+            <a:spLocks noGrp="1"/>
+          </p:cNvSpPr>
+          <p:nvPr>
+            <p:ph type="dt" sz="half" idx="10"/>
+          </p:nvPr>
+        </p:nvSpPr>
+        <p:spPr/>
+        <p:txBody>
+          <a:bodyPr/>
+          <a:lstStyle/>
+          <a:p>
+            <a:pPr>
+              <a:defRPr/>
+            </a:pPr>
+            <a:r>
+              <a:rPr lang="fi-FI" smtClean="0"/>
+              <a:t>2017-03-08</a:t>
+            </a:r>
+            <a:endParaRPr lang="en-US"/>
+          </a:p>
+        </p:txBody>
+      </p:sp>
+      <p:sp>
+        <p:nvSpPr>
+          <p:cNvPr id="5" name="Slide Number Placeholder 4"/>
+          <p:cNvSpPr>
+            <a:spLocks noGrp="1"/>
+          </p:cNvSpPr>
+          <p:nvPr>
+            <p:ph type="sldNum" sz="quarter" idx="12"/>
+          </p:nvPr>
+        </p:nvSpPr>
+        <p:spPr/>
+        <p:txBody>
+          <a:bodyPr/>
+          <a:lstStyle/>
+          <a:p>
+            <a:pPr>
+              <a:defRPr/>
+            </a:pPr>
+            <a:fld id="{2BC46539-7FEE-8846-9EF1-6D13C0293C6C}" type="slidenum">
+              <a:rPr lang="en-US" smtClean="0"/>
+              <a:pPr>
+                <a:defRPr/>
+              </a:pPr>
+              <a:t>27</a:t>
+            </a:fld>
+            <a:endParaRPr lang="en-US"/>
+          </a:p>
+        </p:txBody>
+      </p:sp>
+    </p:spTree>
+    <p:extLst>
+      <p:ext uri="{BB962C8B-B14F-4D97-AF65-F5344CB8AC3E}">
+        <p14:creationId xmlns:p14="http://schemas.microsoft.com/office/powerpoint/2010/main" val="3308428153"/>
+      </p:ext>
+    </p:extLst>
+  </p:cSld>
+  <p:clrMapOvr>
+    <a:masterClrMapping/>
+  </p:clrMapOvr>
+</p:sld>
+</file>
+
+<file path=ppt/slides/slide28.xml><?xml version="1.0" encoding="utf-8"?>
+<p:sld xmlns:a="http://schemas.openxmlformats.org/drawingml/2006/main" xmlns:r="http://schemas.openxmlformats.org/officeDocument/2006/relationships" xmlns:p="http://schemas.openxmlformats.org/presentationml/2006/main">
+  <p:cSld>
+    <p:spTree>
+      <p:nvGrpSpPr>
+        <p:cNvPr id="1" name=""/>
+        <p:cNvGrpSpPr/>
+        <p:nvPr/>
+      </p:nvGrpSpPr>
+      <p:grpSpPr>
+        <a:xfrm>
+          <a:off x="0" y="0"/>
+          <a:ext cx="0" cy="0"/>
+          <a:chOff x="0" y="0"/>
+          <a:chExt cx="0" cy="0"/>
+        </a:xfrm>
+      </p:grpSpPr>
+      <p:sp>
+        <p:nvSpPr>
+          <p:cNvPr id="2" name="Title 1"/>
+          <p:cNvSpPr>
+            <a:spLocks noGrp="1"/>
+          </p:cNvSpPr>
+          <p:nvPr>
+            <p:ph type="title"/>
+          </p:nvPr>
+        </p:nvSpPr>
+        <p:spPr/>
+        <p:txBody>
+          <a:bodyPr/>
+          <a:lstStyle/>
+          <a:p>
+            <a:r>
+              <a:rPr lang="en-US" smtClean="0"/>
+              <a:t>5.4.1 Exercises</a:t>
+            </a:r>
+            <a:endParaRPr lang="en-US"/>
+          </a:p>
+        </p:txBody>
+      </p:sp>
+      <p:sp>
+        <p:nvSpPr>
+          <p:cNvPr id="3" name="Content Placeholder 2"/>
+          <p:cNvSpPr>
+            <a:spLocks noGrp="1"/>
+          </p:cNvSpPr>
+          <p:nvPr>
+            <p:ph idx="1"/>
+          </p:nvPr>
+        </p:nvSpPr>
+        <p:spPr>
+          <a:xfrm>
+            <a:off x="609600" y="1262130"/>
+            <a:ext cx="10749565" cy="4864033"/>
+          </a:xfrm>
+        </p:spPr>
+        <p:txBody>
+          <a:bodyPr/>
+          <a:lstStyle/>
+          <a:p>
+            <a:pPr marL="457200" indent="-457200">
+              <a:buFont typeface="+mj-lt"/>
+              <a:buAutoNum type="arabicPeriod"/>
+            </a:pPr>
+            <a:r>
+              <a:rPr lang="en-US" sz="1600"/>
+              <a:t>Brainstorm at least 5 different ways to assess the typical delay characteristics of a group of flights. Consider the following scenarios:</a:t>
+            </a:r>
+          </a:p>
+          <a:p>
+            <a:pPr lvl="1"/>
+            <a:r>
+              <a:rPr lang="en-US" sz="1200"/>
+              <a:t>A flight is 15 minutes early 50% of the time, and 15 minutes late 50% of the time.</a:t>
+            </a:r>
+          </a:p>
+          <a:p>
+            <a:pPr lvl="1"/>
+            <a:r>
+              <a:rPr lang="en-US" sz="1200"/>
+              <a:t>A flight is always 10 minutes late.</a:t>
+            </a:r>
+          </a:p>
+          <a:p>
+            <a:pPr lvl="1"/>
+            <a:r>
+              <a:rPr lang="en-US" sz="1200"/>
+              <a:t>A flight is 30 minutes early 50% of the time, and 30 minutes late 50% of the time.</a:t>
+            </a:r>
+          </a:p>
+          <a:p>
+            <a:pPr lvl="1"/>
+            <a:r>
+              <a:rPr lang="en-US" sz="1200"/>
+              <a:t>99% of the time a flight is on time. 1% of the time it’s 2 </a:t>
+            </a:r>
+            <a:r>
+              <a:rPr lang="en-US" sz="1200"/>
+              <a:t>hours </a:t>
+            </a:r>
+            <a:r>
+              <a:rPr lang="en-US" sz="1200" smtClean="0"/>
+              <a:t>late.</a:t>
+            </a:r>
+          </a:p>
+          <a:p>
+            <a:pPr marL="349200" lvl="1" indent="0">
+              <a:buNone/>
+            </a:pPr>
+            <a:r>
+              <a:rPr lang="en-US" sz="1200"/>
+              <a:t>Which is more important: arrival delay or departure delay</a:t>
+            </a:r>
+            <a:r>
+              <a:rPr lang="en-US" sz="1200"/>
+              <a:t>? </a:t>
+            </a:r>
+            <a:endParaRPr lang="en-US" sz="1200" smtClean="0"/>
+          </a:p>
+          <a:p>
+            <a:pPr marL="342900" indent="-342900">
+              <a:buFont typeface="+mj-lt"/>
+              <a:buAutoNum type="arabicPeriod"/>
+            </a:pPr>
+            <a:r>
+              <a:rPr lang="en-US" sz="1600" b="1"/>
+              <a:t>Come up with another approach that will give you the same output as not_cancelled %&gt;% count(dest) and not_cancelled %&gt;% count(tailnum, wt = distance) (without using count()).</a:t>
+            </a:r>
+          </a:p>
+          <a:p>
+            <a:pPr marL="342900" indent="-342900">
+              <a:buFont typeface="+mj-lt"/>
+              <a:buAutoNum type="arabicPeriod"/>
+            </a:pPr>
+            <a:r>
+              <a:rPr lang="en-US" sz="1600"/>
+              <a:t>Our definition of cancelled flights (is.na(dep_delay) | is.na(arr_delay) ) is slightly suboptimal. Why? Which is the most important column?</a:t>
+            </a:r>
+          </a:p>
+          <a:p>
+            <a:pPr marL="342900" indent="-342900">
+              <a:buFont typeface="+mj-lt"/>
+              <a:buAutoNum type="arabicPeriod"/>
+            </a:pPr>
+            <a:r>
+              <a:rPr lang="en-US" sz="1600" b="1"/>
+              <a:t>Look at the number of cancelled flights per day. Is there a pattern? Is the proportion of cancelled flights related to the average delay?</a:t>
+            </a:r>
+          </a:p>
+          <a:p>
+            <a:pPr marL="342900" indent="-342900">
+              <a:buFont typeface="+mj-lt"/>
+              <a:buAutoNum type="arabicPeriod"/>
+            </a:pPr>
+            <a:r>
+              <a:rPr lang="en-US" sz="1600"/>
+              <a:t>Which carrier has the worst delays? Challenge: can you disentangle the effects of bad airports vs. bad carriers? Why/why not? (Hint: think about flights %&gt;% group_by(carrier, dest) %&gt;% summarise(n()))</a:t>
+            </a:r>
+          </a:p>
+          <a:p>
+            <a:pPr marL="342900" indent="-342900">
+              <a:buFont typeface="+mj-lt"/>
+              <a:buAutoNum type="arabicPeriod"/>
+            </a:pPr>
+            <a:r>
+              <a:rPr lang="en-US" sz="1600"/>
+              <a:t>What does the sort argument to count() do. When might you use it?</a:t>
+            </a:r>
+          </a:p>
+          <a:p>
+            <a:pPr marL="0" indent="0">
+              <a:buNone/>
+            </a:pPr>
+            <a:endParaRPr lang="en-US" sz="1600">
+              <a:latin typeface="Corbel" panose="020B0503020204020204" pitchFamily="34" charset="0"/>
+              <a:cs typeface="Consolas" panose="020B0609020204030204" pitchFamily="49" charset="0"/>
+            </a:endParaRPr>
+          </a:p>
+          <a:p>
+            <a:r>
+              <a:rPr lang="en-US" sz="1600" smtClean="0">
+                <a:latin typeface="Corbel" panose="020B0503020204020204" pitchFamily="34" charset="0"/>
+                <a:cs typeface="Consolas" panose="020B0609020204030204" pitchFamily="49" charset="0"/>
+              </a:rPr>
+              <a:t>Suggested </a:t>
+            </a:r>
+            <a:r>
+              <a:rPr lang="en-US" sz="1600">
+                <a:latin typeface="Corbel" panose="020B0503020204020204" pitchFamily="34" charset="0"/>
+                <a:cs typeface="Consolas" panose="020B0609020204030204" pitchFamily="49" charset="0"/>
+              </a:rPr>
+              <a:t>order/importance</a:t>
+            </a:r>
+            <a:r>
+              <a:rPr lang="en-US" sz="1600" smtClean="0">
+                <a:latin typeface="Corbel" panose="020B0503020204020204" pitchFamily="34" charset="0"/>
+                <a:cs typeface="Consolas" panose="020B0609020204030204" pitchFamily="49" charset="0"/>
+              </a:rPr>
+              <a:t>: 1, 2 and 3 mainly</a:t>
+            </a:r>
+            <a:r>
+              <a:rPr lang="en-US" sz="1600" b="1" smtClean="0"/>
+              <a:t/>
+            </a:r>
+            <a:br>
+              <a:rPr lang="en-US" sz="1600" b="1" smtClean="0"/>
+            </a:br>
+            <a:endParaRPr lang="en-US" sz="1600" b="1" smtClean="0"/>
+          </a:p>
+          <a:p>
+            <a:endParaRPr lang="en-US" sz="1600" b="1"/>
+          </a:p>
+        </p:txBody>
+      </p:sp>
+      <p:sp>
+        <p:nvSpPr>
+          <p:cNvPr id="4" name="Date Placeholder 3"/>
+          <p:cNvSpPr>
+            <a:spLocks noGrp="1"/>
+          </p:cNvSpPr>
+          <p:nvPr>
+            <p:ph type="dt" sz="half" idx="10"/>
+          </p:nvPr>
+        </p:nvSpPr>
+        <p:spPr/>
+        <p:txBody>
+          <a:bodyPr/>
+          <a:lstStyle/>
+          <a:p>
+            <a:pPr>
+              <a:defRPr/>
+            </a:pPr>
+            <a:r>
+              <a:rPr lang="fi-FI" smtClean="0"/>
+              <a:t>2017-03-08</a:t>
+            </a:r>
+            <a:endParaRPr lang="en-US"/>
+          </a:p>
+        </p:txBody>
+      </p:sp>
+      <p:sp>
+        <p:nvSpPr>
+          <p:cNvPr id="5" name="Slide Number Placeholder 4"/>
+          <p:cNvSpPr>
+            <a:spLocks noGrp="1"/>
+          </p:cNvSpPr>
+          <p:nvPr>
+            <p:ph type="sldNum" sz="quarter" idx="12"/>
+          </p:nvPr>
+        </p:nvSpPr>
+        <p:spPr/>
+        <p:txBody>
+          <a:bodyPr/>
+          <a:lstStyle/>
+          <a:p>
+            <a:pPr>
+              <a:defRPr/>
+            </a:pPr>
+            <a:fld id="{2BC46539-7FEE-8846-9EF1-6D13C0293C6C}" type="slidenum">
+              <a:rPr lang="en-US" smtClean="0"/>
+              <a:pPr>
+                <a:defRPr/>
+              </a:pPr>
+              <a:t>28</a:t>
+            </a:fld>
+            <a:endParaRPr lang="en-US"/>
+          </a:p>
+        </p:txBody>
+      </p:sp>
+    </p:spTree>
+    <p:extLst>
+      <p:ext uri="{BB962C8B-B14F-4D97-AF65-F5344CB8AC3E}">
+        <p14:creationId xmlns:p14="http://schemas.microsoft.com/office/powerpoint/2010/main" val="1781969830"/>
+      </p:ext>
+    </p:extLst>
+  </p:cSld>
+  <p:clrMapOvr>
+    <a:masterClrMapping/>
+  </p:clrMapOvr>
+</p:sld>
+</file>
+
+<file path=ppt/slides/slide29.xml><?xml version="1.0" encoding="utf-8"?>
+<p:sld xmlns:a="http://schemas.openxmlformats.org/drawingml/2006/main" xmlns:r="http://schemas.openxmlformats.org/officeDocument/2006/relationships" xmlns:p="http://schemas.openxmlformats.org/presentationml/2006/main">
+  <p:cSld>
+    <p:spTree>
+      <p:nvGrpSpPr>
+        <p:cNvPr id="1" name=""/>
+        <p:cNvGrpSpPr/>
+        <p:nvPr/>
+      </p:nvGrpSpPr>
+      <p:grpSpPr>
+        <a:xfrm>
+          <a:off x="0" y="0"/>
+          <a:ext cx="0" cy="0"/>
+          <a:chOff x="0" y="0"/>
+          <a:chExt cx="0" cy="0"/>
+        </a:xfrm>
+      </p:grpSpPr>
+      <p:sp>
+        <p:nvSpPr>
+          <p:cNvPr id="2" name="Title 1"/>
+          <p:cNvSpPr>
+            <a:spLocks noGrp="1"/>
+          </p:cNvSpPr>
+          <p:nvPr>
+            <p:ph type="title"/>
+          </p:nvPr>
+        </p:nvSpPr>
+        <p:spPr/>
+        <p:txBody>
+          <a:bodyPr/>
+          <a:lstStyle/>
+          <a:p>
+            <a:r>
+              <a:rPr lang="en-US" smtClean="0"/>
+              <a:t>ggplot2</a:t>
+            </a:r>
+            <a:endParaRPr lang="en-US"/>
+          </a:p>
+        </p:txBody>
+      </p:sp>
+      <p:sp>
+        <p:nvSpPr>
+          <p:cNvPr id="3" name="Content Placeholder 2"/>
+          <p:cNvSpPr>
+            <a:spLocks noGrp="1"/>
+          </p:cNvSpPr>
+          <p:nvPr>
+            <p:ph idx="1"/>
+          </p:nvPr>
+        </p:nvSpPr>
+        <p:spPr/>
+        <p:txBody>
+          <a:bodyPr/>
+          <a:lstStyle/>
+          <a:p>
+            <a:r>
+              <a:rPr lang="en-US" smtClean="0"/>
+              <a:t>"It's </a:t>
+            </a:r>
+            <a:r>
+              <a:rPr lang="en-US"/>
+              <a:t>hard to succintly describe how ggplot2 works because it embodies a deep philosophy of visualisation</a:t>
+            </a:r>
+            <a:r>
+              <a:rPr lang="en-US" smtClean="0"/>
+              <a:t>."</a:t>
+            </a:r>
+          </a:p>
+          <a:p>
+            <a:r>
+              <a:rPr lang="en-US" smtClean="0"/>
+              <a:t>But here's a simple example:</a:t>
+            </a:r>
+          </a:p>
+          <a:p>
+            <a:pPr marL="349200" lvl="1" indent="0">
+              <a:buNone/>
+            </a:pPr>
+            <a:r>
+              <a:rPr lang="en-US" smtClean="0"/>
+              <a:t>ggplot(iris)+</a:t>
+            </a:r>
+          </a:p>
+          <a:p>
+            <a:pPr marL="349200" lvl="1" indent="0">
+              <a:buNone/>
+            </a:pPr>
+            <a:r>
+              <a:rPr lang="en-US" smtClean="0"/>
+              <a:t>geom_point(aes(x=Sepal.Width, y=Sepal.Length, col=Species))</a:t>
+            </a:r>
+            <a:endParaRPr lang="en-US"/>
+          </a:p>
+          <a:p>
+            <a:r>
+              <a:rPr lang="en-US" smtClean="0"/>
+              <a:t>Think of that as saying: "Hey ggplot, I want to make a graph out of the iris data </a:t>
+            </a:r>
+            <a:r>
+              <a:rPr lang="en-US"/>
+              <a:t>set. And I want there to be </a:t>
+            </a:r>
+            <a:r>
+              <a:rPr lang="en-US" smtClean="0"/>
+              <a:t>points, </a:t>
+            </a:r>
+            <a:r>
+              <a:rPr lang="en-US"/>
+              <a:t>so </a:t>
+            </a:r>
+            <a:r>
+              <a:rPr lang="en-US" smtClean="0"/>
+              <a:t>that Sepal.Width maps to their x coord., Sepal.Length to y coord., and Species to their color."</a:t>
+            </a:r>
+          </a:p>
+          <a:p>
+            <a:r>
+              <a:rPr lang="en-US"/>
+              <a:t>Please </a:t>
+            </a:r>
+            <a:r>
+              <a:rPr lang="en-US" smtClean="0"/>
+              <a:t>read </a:t>
+            </a:r>
+            <a:r>
+              <a:rPr lang="en-US">
+                <a:hlinkClick r:id="rId2" tooltip="http://r4ds.had.co.nz/data-visualisation.html"/>
+              </a:rPr>
+              <a:t>http://r4ds.had.co.nz/data-visualisation.html</a:t>
+            </a:r>
+            <a:endParaRPr lang="en-US" smtClean="0"/>
+          </a:p>
+        </p:txBody>
+      </p:sp>
+      <p:sp>
+        <p:nvSpPr>
+          <p:cNvPr id="4" name="Date Placeholder 3"/>
+          <p:cNvSpPr>
+            <a:spLocks noGrp="1"/>
+          </p:cNvSpPr>
+          <p:nvPr>
+            <p:ph type="dt" sz="half" idx="10"/>
+          </p:nvPr>
+        </p:nvSpPr>
+        <p:spPr/>
+        <p:txBody>
+          <a:bodyPr/>
+          <a:lstStyle/>
+          <a:p>
+            <a:pPr>
+              <a:defRPr/>
+            </a:pPr>
+            <a:r>
+              <a:rPr lang="fi-FI" smtClean="0"/>
+              <a:t>2017-03-08</a:t>
+            </a:r>
+            <a:endParaRPr lang="en-US"/>
+          </a:p>
+        </p:txBody>
+      </p:sp>
+      <p:sp>
+        <p:nvSpPr>
+          <p:cNvPr id="5" name="Slide Number Placeholder 4"/>
+          <p:cNvSpPr>
+            <a:spLocks noGrp="1"/>
+          </p:cNvSpPr>
+          <p:nvPr>
+            <p:ph type="sldNum" sz="quarter" idx="12"/>
+          </p:nvPr>
+        </p:nvSpPr>
+        <p:spPr/>
+        <p:txBody>
+          <a:bodyPr/>
+          <a:lstStyle/>
+          <a:p>
+            <a:pPr>
+              <a:defRPr/>
+            </a:pPr>
+            <a:fld id="{2BC46539-7FEE-8846-9EF1-6D13C0293C6C}" type="slidenum">
+              <a:rPr lang="en-US" smtClean="0"/>
+              <a:pPr>
+                <a:defRPr/>
+              </a:pPr>
+              <a:t>29</a:t>
+            </a:fld>
+            <a:endParaRPr lang="en-US"/>
+          </a:p>
+        </p:txBody>
+      </p:sp>
+    </p:spTree>
+    <p:extLst>
+      <p:ext uri="{BB962C8B-B14F-4D97-AF65-F5344CB8AC3E}">
+        <p14:creationId xmlns:p14="http://schemas.microsoft.com/office/powerpoint/2010/main" val="2176735659"/>
       </p:ext>
     </p:extLst>
   </p:cSld>
@@ -26442,6 +27332,1432 @@
     <p:extLst>
       <p:ext uri="{BB962C8B-B14F-4D97-AF65-F5344CB8AC3E}">
         <p14:creationId xmlns:p14="http://schemas.microsoft.com/office/powerpoint/2010/main" val="2433974728"/>
+      </p:ext>
+    </p:extLst>
+  </p:cSld>
+  <p:clrMapOvr>
+    <a:masterClrMapping/>
+  </p:clrMapOvr>
+  <p:timing>
+    <p:tnLst>
+      <p:par>
+        <p:cTn id="1" dur="indefinite" restart="never" nodeType="tmRoot"/>
+      </p:par>
+    </p:tnLst>
+  </p:timing>
+</p:sld>
+</file>
+
+<file path=ppt/slides/slide30.xml><?xml version="1.0" encoding="utf-8"?>
+<p:sld xmlns:a="http://schemas.openxmlformats.org/drawingml/2006/main" xmlns:r="http://schemas.openxmlformats.org/officeDocument/2006/relationships" xmlns:p="http://schemas.openxmlformats.org/presentationml/2006/main">
+  <p:cSld>
+    <p:spTree>
+      <p:nvGrpSpPr>
+        <p:cNvPr id="1" name=""/>
+        <p:cNvGrpSpPr/>
+        <p:nvPr/>
+      </p:nvGrpSpPr>
+      <p:grpSpPr>
+        <a:xfrm>
+          <a:off x="0" y="0"/>
+          <a:ext cx="0" cy="0"/>
+          <a:chOff x="0" y="0"/>
+          <a:chExt cx="0" cy="0"/>
+        </a:xfrm>
+      </p:grpSpPr>
+      <p:sp>
+        <p:nvSpPr>
+          <p:cNvPr id="2" name="Title 1"/>
+          <p:cNvSpPr>
+            <a:spLocks noGrp="1"/>
+          </p:cNvSpPr>
+          <p:nvPr>
+            <p:ph type="title"/>
+          </p:nvPr>
+        </p:nvSpPr>
+        <p:spPr/>
+        <p:txBody>
+          <a:bodyPr/>
+          <a:lstStyle/>
+          <a:p>
+            <a:r>
+              <a:rPr lang="en-US"/>
+              <a:t>f</a:t>
+            </a:r>
+            <a:r>
+              <a:rPr lang="en-US" smtClean="0"/>
+              <a:t>ilter, arrange, select</a:t>
+            </a:r>
+            <a:endParaRPr lang="en-US"/>
+          </a:p>
+        </p:txBody>
+      </p:sp>
+      <p:sp>
+        <p:nvSpPr>
+          <p:cNvPr id="3" name="Content Placeholder 2"/>
+          <p:cNvSpPr>
+            <a:spLocks noGrp="1"/>
+          </p:cNvSpPr>
+          <p:nvPr>
+            <p:ph idx="1"/>
+          </p:nvPr>
+        </p:nvSpPr>
+        <p:spPr/>
+        <p:txBody>
+          <a:bodyPr/>
+          <a:lstStyle/>
+          <a:p>
+            <a:r>
+              <a:rPr lang="en-US" smtClean="0"/>
+              <a:t>Please read </a:t>
+            </a:r>
+            <a:r>
+              <a:rPr lang="en-US" smtClean="0">
+                <a:hlinkClick r:id="rId2"/>
+              </a:rPr>
+              <a:t>http://r4ds.had.co.nz/transform.html</a:t>
+            </a:r>
+            <a:r>
+              <a:rPr lang="en-US" smtClean="0"/>
+              <a:t> and the Data Wrangling cheat sheet</a:t>
+            </a:r>
+            <a:endParaRPr lang="en-US" dirty="0" smtClean="0"/>
+          </a:p>
+          <a:p>
+            <a:r>
+              <a:rPr lang="en-US" i="1" dirty="0" smtClean="0"/>
+              <a:t>filter</a:t>
+            </a:r>
+            <a:r>
+              <a:rPr lang="en-US" dirty="0" smtClean="0"/>
+              <a:t> is the function in </a:t>
+            </a:r>
+            <a:r>
+              <a:rPr lang="en-US" i="1" dirty="0" err="1" smtClean="0"/>
+              <a:t>dplyr</a:t>
+            </a:r>
+            <a:r>
+              <a:rPr lang="en-US" dirty="0" smtClean="0"/>
+              <a:t> that works like subset in base R</a:t>
+            </a:r>
+          </a:p>
+          <a:p>
+            <a:pPr lvl="1"/>
+            <a:r>
+              <a:rPr lang="en-US" dirty="0" smtClean="0"/>
+              <a:t>note the ready made functions for random sampling, and extracting unique rows</a:t>
+            </a:r>
+          </a:p>
+          <a:p>
+            <a:r>
+              <a:rPr lang="en-US" i="1"/>
+              <a:t>arrange</a:t>
+            </a:r>
+            <a:r>
+              <a:rPr lang="en-US"/>
+              <a:t> is the function for arranging rows according to values of a </a:t>
+            </a:r>
+            <a:r>
+              <a:rPr lang="en-US" smtClean="0"/>
+              <a:t>column</a:t>
+            </a:r>
+            <a:endParaRPr lang="en-US" i="1" smtClean="0"/>
+          </a:p>
+          <a:p>
+            <a:r>
+              <a:rPr lang="en-US" i="1" smtClean="0"/>
+              <a:t>select</a:t>
+            </a:r>
+            <a:r>
+              <a:rPr lang="en-US" smtClean="0"/>
+              <a:t> </a:t>
+            </a:r>
+            <a:r>
+              <a:rPr lang="en-US" dirty="0" smtClean="0"/>
+              <a:t>is the function for selecting columns</a:t>
+            </a:r>
+          </a:p>
+          <a:p>
+            <a:pPr lvl="1"/>
+            <a:r>
+              <a:rPr lang="en-US" dirty="0" smtClean="0"/>
+              <a:t>note the </a:t>
+            </a:r>
+            <a:r>
+              <a:rPr lang="en-US" smtClean="0"/>
+              <a:t>helper functions</a:t>
+            </a:r>
+            <a:endParaRPr lang="en-US" dirty="0" smtClean="0"/>
+          </a:p>
+        </p:txBody>
+      </p:sp>
+      <p:sp>
+        <p:nvSpPr>
+          <p:cNvPr id="4" name="Date Placeholder 3"/>
+          <p:cNvSpPr>
+            <a:spLocks noGrp="1"/>
+          </p:cNvSpPr>
+          <p:nvPr>
+            <p:ph type="dt" sz="half" idx="10"/>
+          </p:nvPr>
+        </p:nvSpPr>
+        <p:spPr/>
+        <p:txBody>
+          <a:bodyPr/>
+          <a:lstStyle/>
+          <a:p>
+            <a:pPr>
+              <a:defRPr/>
+            </a:pPr>
+            <a:r>
+              <a:rPr lang="fi-FI" smtClean="0"/>
+              <a:t>2017-03-08</a:t>
+            </a:r>
+            <a:endParaRPr lang="en-US"/>
+          </a:p>
+        </p:txBody>
+      </p:sp>
+      <p:sp>
+        <p:nvSpPr>
+          <p:cNvPr id="5" name="Slide Number Placeholder 4"/>
+          <p:cNvSpPr>
+            <a:spLocks noGrp="1"/>
+          </p:cNvSpPr>
+          <p:nvPr>
+            <p:ph type="sldNum" sz="quarter" idx="12"/>
+          </p:nvPr>
+        </p:nvSpPr>
+        <p:spPr/>
+        <p:txBody>
+          <a:bodyPr/>
+          <a:lstStyle/>
+          <a:p>
+            <a:pPr>
+              <a:defRPr/>
+            </a:pPr>
+            <a:fld id="{2BC46539-7FEE-8846-9EF1-6D13C0293C6C}" type="slidenum">
+              <a:rPr lang="en-US" smtClean="0"/>
+              <a:pPr>
+                <a:defRPr/>
+              </a:pPr>
+              <a:t>30</a:t>
+            </a:fld>
+            <a:endParaRPr lang="en-US"/>
+          </a:p>
+        </p:txBody>
+      </p:sp>
+    </p:spTree>
+    <p:extLst>
+      <p:ext uri="{BB962C8B-B14F-4D97-AF65-F5344CB8AC3E}">
+        <p14:creationId xmlns:p14="http://schemas.microsoft.com/office/powerpoint/2010/main" val="581569891"/>
+      </p:ext>
+    </p:extLst>
+  </p:cSld>
+  <p:clrMapOvr>
+    <a:masterClrMapping/>
+  </p:clrMapOvr>
+  <p:timing>
+    <p:tnLst>
+      <p:par>
+        <p:cTn id="1" dur="indefinite" restart="never" nodeType="tmRoot"/>
+      </p:par>
+    </p:tnLst>
+  </p:timing>
+</p:sld>
+</file>
+
+<file path=ppt/slides/slide31.xml><?xml version="1.0" encoding="utf-8"?>
+<p:sld xmlns:a="http://schemas.openxmlformats.org/drawingml/2006/main" xmlns:r="http://schemas.openxmlformats.org/officeDocument/2006/relationships" xmlns:p="http://schemas.openxmlformats.org/presentationml/2006/main">
+  <p:cSld>
+    <p:spTree>
+      <p:nvGrpSpPr>
+        <p:cNvPr id="1" name=""/>
+        <p:cNvGrpSpPr/>
+        <p:nvPr/>
+      </p:nvGrpSpPr>
+      <p:grpSpPr>
+        <a:xfrm>
+          <a:off x="0" y="0"/>
+          <a:ext cx="0" cy="0"/>
+          <a:chOff x="0" y="0"/>
+          <a:chExt cx="0" cy="0"/>
+        </a:xfrm>
+      </p:grpSpPr>
+      <p:sp>
+        <p:nvSpPr>
+          <p:cNvPr id="2" name="Title 1"/>
+          <p:cNvSpPr>
+            <a:spLocks noGrp="1"/>
+          </p:cNvSpPr>
+          <p:nvPr>
+            <p:ph type="title"/>
+          </p:nvPr>
+        </p:nvSpPr>
+        <p:spPr/>
+        <p:txBody>
+          <a:bodyPr/>
+          <a:lstStyle/>
+          <a:p>
+            <a:r>
+              <a:rPr lang="en-US" smtClean="0"/>
+              <a:t>Making new variables</a:t>
+            </a:r>
+            <a:endParaRPr lang="en-US"/>
+          </a:p>
+        </p:txBody>
+      </p:sp>
+      <p:sp>
+        <p:nvSpPr>
+          <p:cNvPr id="3" name="Content Placeholder 2"/>
+          <p:cNvSpPr>
+            <a:spLocks noGrp="1"/>
+          </p:cNvSpPr>
+          <p:nvPr>
+            <p:ph idx="1"/>
+          </p:nvPr>
+        </p:nvSpPr>
+        <p:spPr/>
+        <p:txBody>
+          <a:bodyPr/>
+          <a:lstStyle/>
+          <a:p>
+            <a:r>
+              <a:rPr lang="en-US" i="1" dirty="0" smtClean="0"/>
+              <a:t>mutate</a:t>
+            </a:r>
+            <a:r>
+              <a:rPr lang="en-US" dirty="0" smtClean="0"/>
+              <a:t> is the function for creating new variables</a:t>
+            </a:r>
+          </a:p>
+          <a:p>
+            <a:pPr lvl="1"/>
+            <a:r>
+              <a:rPr lang="en-US" dirty="0" smtClean="0"/>
+              <a:t>related to </a:t>
+            </a:r>
+            <a:r>
+              <a:rPr lang="en-US" i="1" dirty="0" smtClean="0"/>
+              <a:t>with</a:t>
+            </a:r>
+            <a:r>
+              <a:rPr lang="en-US" dirty="0" smtClean="0"/>
+              <a:t> and </a:t>
+            </a:r>
+            <a:r>
+              <a:rPr lang="en-US" i="1" dirty="0" smtClean="0"/>
+              <a:t>within</a:t>
+            </a:r>
+            <a:r>
+              <a:rPr lang="en-US" dirty="0" smtClean="0"/>
+              <a:t> functions of base R: no need for the $ notation</a:t>
+            </a:r>
+          </a:p>
+          <a:p>
+            <a:pPr lvl="1"/>
+            <a:r>
+              <a:rPr lang="en-US" dirty="0" smtClean="0"/>
+              <a:t>you can make many inside one function call, and use the new ones immediately</a:t>
+            </a:r>
+          </a:p>
+          <a:p>
+            <a:r>
+              <a:rPr lang="en-US" i="1" dirty="0" smtClean="0"/>
+              <a:t>transmute</a:t>
+            </a:r>
+            <a:r>
+              <a:rPr lang="en-US" dirty="0" smtClean="0"/>
+              <a:t> does the same but only keeps the created ones</a:t>
+            </a:r>
+          </a:p>
+          <a:p>
+            <a:r>
+              <a:rPr lang="en-US" dirty="0" smtClean="0"/>
+              <a:t>Both can be combined with </a:t>
+            </a:r>
+            <a:r>
+              <a:rPr lang="en-US" b="1" dirty="0" smtClean="0"/>
+              <a:t>window functions</a:t>
+            </a:r>
+          </a:p>
+          <a:p>
+            <a:pPr lvl="1"/>
+            <a:r>
+              <a:rPr lang="en-US" dirty="0" smtClean="0"/>
+              <a:t>these are functions that take one vector and return another of the same length</a:t>
+            </a:r>
+          </a:p>
+          <a:p>
+            <a:pPr lvl="1"/>
+            <a:r>
+              <a:rPr lang="en-US" dirty="0" smtClean="0"/>
+              <a:t>such as lags, ranks, cumulative sums </a:t>
+            </a:r>
+            <a:r>
+              <a:rPr lang="en-US" dirty="0" err="1" smtClean="0"/>
+              <a:t>etc</a:t>
+            </a:r>
+            <a:endParaRPr lang="en-US" dirty="0"/>
+          </a:p>
+        </p:txBody>
+      </p:sp>
+      <p:sp>
+        <p:nvSpPr>
+          <p:cNvPr id="4" name="Date Placeholder 3"/>
+          <p:cNvSpPr>
+            <a:spLocks noGrp="1"/>
+          </p:cNvSpPr>
+          <p:nvPr>
+            <p:ph type="dt" sz="half" idx="10"/>
+          </p:nvPr>
+        </p:nvSpPr>
+        <p:spPr/>
+        <p:txBody>
+          <a:bodyPr/>
+          <a:lstStyle/>
+          <a:p>
+            <a:pPr>
+              <a:defRPr/>
+            </a:pPr>
+            <a:r>
+              <a:rPr lang="fi-FI" smtClean="0"/>
+              <a:t>2017-03-08</a:t>
+            </a:r>
+            <a:endParaRPr lang="en-US"/>
+          </a:p>
+        </p:txBody>
+      </p:sp>
+      <p:sp>
+        <p:nvSpPr>
+          <p:cNvPr id="5" name="Slide Number Placeholder 4"/>
+          <p:cNvSpPr>
+            <a:spLocks noGrp="1"/>
+          </p:cNvSpPr>
+          <p:nvPr>
+            <p:ph type="sldNum" sz="quarter" idx="12"/>
+          </p:nvPr>
+        </p:nvSpPr>
+        <p:spPr/>
+        <p:txBody>
+          <a:bodyPr/>
+          <a:lstStyle/>
+          <a:p>
+            <a:pPr>
+              <a:defRPr/>
+            </a:pPr>
+            <a:fld id="{2BC46539-7FEE-8846-9EF1-6D13C0293C6C}" type="slidenum">
+              <a:rPr lang="en-US" smtClean="0"/>
+              <a:pPr>
+                <a:defRPr/>
+              </a:pPr>
+              <a:t>31</a:t>
+            </a:fld>
+            <a:endParaRPr lang="en-US"/>
+          </a:p>
+        </p:txBody>
+      </p:sp>
+    </p:spTree>
+    <p:extLst>
+      <p:ext uri="{BB962C8B-B14F-4D97-AF65-F5344CB8AC3E}">
+        <p14:creationId xmlns:p14="http://schemas.microsoft.com/office/powerpoint/2010/main" val="2924514008"/>
+      </p:ext>
+    </p:extLst>
+  </p:cSld>
+  <p:clrMapOvr>
+    <a:masterClrMapping/>
+  </p:clrMapOvr>
+  <p:timing>
+    <p:tnLst>
+      <p:par>
+        <p:cTn id="1" dur="indefinite" restart="never" nodeType="tmRoot"/>
+      </p:par>
+    </p:tnLst>
+  </p:timing>
+</p:sld>
+</file>
+
+<file path=ppt/slides/slide32.xml><?xml version="1.0" encoding="utf-8"?>
+<p:sld xmlns:a="http://schemas.openxmlformats.org/drawingml/2006/main" xmlns:r="http://schemas.openxmlformats.org/officeDocument/2006/relationships" xmlns:p="http://schemas.openxmlformats.org/presentationml/2006/main">
+  <p:cSld>
+    <p:spTree>
+      <p:nvGrpSpPr>
+        <p:cNvPr id="1" name=""/>
+        <p:cNvGrpSpPr/>
+        <p:nvPr/>
+      </p:nvGrpSpPr>
+      <p:grpSpPr>
+        <a:xfrm>
+          <a:off x="0" y="0"/>
+          <a:ext cx="0" cy="0"/>
+          <a:chOff x="0" y="0"/>
+          <a:chExt cx="0" cy="0"/>
+        </a:xfrm>
+      </p:grpSpPr>
+      <p:sp>
+        <p:nvSpPr>
+          <p:cNvPr id="2" name="Title 1"/>
+          <p:cNvSpPr>
+            <a:spLocks noGrp="1"/>
+          </p:cNvSpPr>
+          <p:nvPr>
+            <p:ph type="title"/>
+          </p:nvPr>
+        </p:nvSpPr>
+        <p:spPr/>
+        <p:txBody>
+          <a:bodyPr/>
+          <a:lstStyle/>
+          <a:p>
+            <a:r>
+              <a:rPr lang="en-US" smtClean="0"/>
+              <a:t>Summarising and grouping data</a:t>
+            </a:r>
+            <a:endParaRPr lang="en-US"/>
+          </a:p>
+        </p:txBody>
+      </p:sp>
+      <p:sp>
+        <p:nvSpPr>
+          <p:cNvPr id="3" name="Content Placeholder 2"/>
+          <p:cNvSpPr>
+            <a:spLocks noGrp="1"/>
+          </p:cNvSpPr>
+          <p:nvPr>
+            <p:ph idx="1"/>
+          </p:nvPr>
+        </p:nvSpPr>
+        <p:spPr/>
+        <p:txBody>
+          <a:bodyPr/>
+          <a:lstStyle/>
+          <a:p>
+            <a:r>
+              <a:rPr lang="en-US" i="1" dirty="0" err="1" smtClean="0"/>
+              <a:t>summarise</a:t>
+            </a:r>
+            <a:r>
+              <a:rPr lang="en-US" dirty="0" smtClean="0"/>
+              <a:t> uses </a:t>
+            </a:r>
+            <a:r>
+              <a:rPr lang="en-US" b="1" dirty="0" smtClean="0"/>
+              <a:t>summary functions </a:t>
+            </a:r>
+            <a:r>
+              <a:rPr lang="en-US" dirty="0" smtClean="0"/>
+              <a:t>to create a single value out of a vector (not to be confused with </a:t>
+            </a:r>
+            <a:r>
+              <a:rPr lang="en-US" i="1" dirty="0" smtClean="0"/>
+              <a:t>summary</a:t>
+            </a:r>
+            <a:r>
+              <a:rPr lang="en-US" dirty="0" smtClean="0"/>
+              <a:t> of base R!)</a:t>
+            </a:r>
+          </a:p>
+          <a:p>
+            <a:r>
+              <a:rPr lang="en-US" dirty="0" smtClean="0"/>
+              <a:t>perhaps makes more sense in the</a:t>
+            </a:r>
+            <a:r>
+              <a:rPr lang="en-US" i="1" dirty="0" smtClean="0"/>
+              <a:t> </a:t>
+            </a:r>
+            <a:r>
+              <a:rPr lang="en-US" i="1" dirty="0" err="1" smtClean="0"/>
+              <a:t>summarise_each</a:t>
+            </a:r>
+            <a:r>
+              <a:rPr lang="en-US" i="1" dirty="0" smtClean="0"/>
+              <a:t> </a:t>
+            </a:r>
+            <a:r>
+              <a:rPr lang="en-US" dirty="0" smtClean="0"/>
+              <a:t>version</a:t>
+            </a:r>
+          </a:p>
+          <a:p>
+            <a:r>
+              <a:rPr lang="en-US" dirty="0" smtClean="0"/>
+              <a:t>makes much more sense when combined with grouping:</a:t>
+            </a:r>
+          </a:p>
+          <a:p>
+            <a:pPr lvl="1"/>
+            <a:r>
+              <a:rPr lang="en-US" i="1" dirty="0" err="1" smtClean="0"/>
+              <a:t>group_by</a:t>
+            </a:r>
+            <a:r>
+              <a:rPr lang="en-US" dirty="0" smtClean="0"/>
+              <a:t> creates a new data frame that is internally split in to parts according to the values of one of the variables (factor, or factor-like)</a:t>
+            </a:r>
+          </a:p>
+          <a:p>
+            <a:pPr lvl="1"/>
+            <a:r>
+              <a:rPr lang="en-US" i="1" dirty="0" err="1" smtClean="0"/>
+              <a:t>summarise</a:t>
+            </a:r>
+            <a:r>
+              <a:rPr lang="en-US" dirty="0" smtClean="0"/>
+              <a:t> on the grouped data will do the summary </a:t>
+            </a:r>
+            <a:r>
+              <a:rPr lang="en-US" b="1" dirty="0" smtClean="0"/>
+              <a:t>by group!</a:t>
+            </a:r>
+          </a:p>
+          <a:p>
+            <a:pPr lvl="1"/>
+            <a:r>
+              <a:rPr lang="en-US" dirty="0" smtClean="0"/>
+              <a:t>this is related to </a:t>
+            </a:r>
+            <a:r>
+              <a:rPr lang="en-US" i="1" dirty="0" smtClean="0"/>
+              <a:t>aggregate</a:t>
+            </a:r>
+            <a:r>
+              <a:rPr lang="en-US" dirty="0" smtClean="0"/>
+              <a:t> of base R</a:t>
+            </a:r>
+          </a:p>
+          <a:p>
+            <a:r>
+              <a:rPr lang="en-US" dirty="0" smtClean="0"/>
+              <a:t>grouping also works with the window functions of </a:t>
+            </a:r>
+            <a:r>
+              <a:rPr lang="en-US" i="1" dirty="0" smtClean="0"/>
+              <a:t>transmute</a:t>
+            </a:r>
+          </a:p>
+          <a:p>
+            <a:pPr lvl="1"/>
+            <a:r>
+              <a:rPr lang="en-US" dirty="0" smtClean="0"/>
+              <a:t>will do e.g. ranks within the group levels, not in total</a:t>
+            </a:r>
+          </a:p>
+        </p:txBody>
+      </p:sp>
+      <p:sp>
+        <p:nvSpPr>
+          <p:cNvPr id="4" name="Date Placeholder 3"/>
+          <p:cNvSpPr>
+            <a:spLocks noGrp="1"/>
+          </p:cNvSpPr>
+          <p:nvPr>
+            <p:ph type="dt" sz="half" idx="10"/>
+          </p:nvPr>
+        </p:nvSpPr>
+        <p:spPr/>
+        <p:txBody>
+          <a:bodyPr/>
+          <a:lstStyle/>
+          <a:p>
+            <a:pPr>
+              <a:defRPr/>
+            </a:pPr>
+            <a:r>
+              <a:rPr lang="fi-FI" smtClean="0"/>
+              <a:t>2017-03-08</a:t>
+            </a:r>
+            <a:endParaRPr lang="en-US"/>
+          </a:p>
+        </p:txBody>
+      </p:sp>
+      <p:sp>
+        <p:nvSpPr>
+          <p:cNvPr id="5" name="Slide Number Placeholder 4"/>
+          <p:cNvSpPr>
+            <a:spLocks noGrp="1"/>
+          </p:cNvSpPr>
+          <p:nvPr>
+            <p:ph type="sldNum" sz="quarter" idx="12"/>
+          </p:nvPr>
+        </p:nvSpPr>
+        <p:spPr/>
+        <p:txBody>
+          <a:bodyPr/>
+          <a:lstStyle/>
+          <a:p>
+            <a:pPr>
+              <a:defRPr/>
+            </a:pPr>
+            <a:fld id="{2BC46539-7FEE-8846-9EF1-6D13C0293C6C}" type="slidenum">
+              <a:rPr lang="en-US" smtClean="0"/>
+              <a:pPr>
+                <a:defRPr/>
+              </a:pPr>
+              <a:t>32</a:t>
+            </a:fld>
+            <a:endParaRPr lang="en-US"/>
+          </a:p>
+        </p:txBody>
+      </p:sp>
+    </p:spTree>
+    <p:extLst>
+      <p:ext uri="{BB962C8B-B14F-4D97-AF65-F5344CB8AC3E}">
+        <p14:creationId xmlns:p14="http://schemas.microsoft.com/office/powerpoint/2010/main" val="4277279678"/>
+      </p:ext>
+    </p:extLst>
+  </p:cSld>
+  <p:clrMapOvr>
+    <a:masterClrMapping/>
+  </p:clrMapOvr>
+  <p:timing>
+    <p:tnLst>
+      <p:par>
+        <p:cTn id="1" dur="indefinite" restart="never" nodeType="tmRoot"/>
+      </p:par>
+    </p:tnLst>
+  </p:timing>
+</p:sld>
+</file>
+
+<file path=ppt/slides/slide33.xml><?xml version="1.0" encoding="utf-8"?>
+<p:sld xmlns:a="http://schemas.openxmlformats.org/drawingml/2006/main" xmlns:r="http://schemas.openxmlformats.org/officeDocument/2006/relationships" xmlns:p="http://schemas.openxmlformats.org/presentationml/2006/main">
+  <p:cSld>
+    <p:spTree>
+      <p:nvGrpSpPr>
+        <p:cNvPr id="1" name=""/>
+        <p:cNvGrpSpPr/>
+        <p:nvPr/>
+      </p:nvGrpSpPr>
+      <p:grpSpPr>
+        <a:xfrm>
+          <a:off x="0" y="0"/>
+          <a:ext cx="0" cy="0"/>
+          <a:chOff x="0" y="0"/>
+          <a:chExt cx="0" cy="0"/>
+        </a:xfrm>
+      </p:grpSpPr>
+      <p:sp>
+        <p:nvSpPr>
+          <p:cNvPr id="2" name="Title 1"/>
+          <p:cNvSpPr>
+            <a:spLocks noGrp="1"/>
+          </p:cNvSpPr>
+          <p:nvPr>
+            <p:ph type="title"/>
+          </p:nvPr>
+        </p:nvSpPr>
+        <p:spPr/>
+        <p:txBody>
+          <a:bodyPr/>
+          <a:lstStyle/>
+          <a:p>
+            <a:r>
+              <a:rPr lang="en-US" smtClean="0"/>
+              <a:t>Pipe</a:t>
+            </a:r>
+            <a:endParaRPr lang="en-US"/>
+          </a:p>
+        </p:txBody>
+      </p:sp>
+      <p:sp>
+        <p:nvSpPr>
+          <p:cNvPr id="3" name="Content Placeholder 2"/>
+          <p:cNvSpPr>
+            <a:spLocks noGrp="1"/>
+          </p:cNvSpPr>
+          <p:nvPr>
+            <p:ph idx="1"/>
+          </p:nvPr>
+        </p:nvSpPr>
+        <p:spPr>
+          <a:xfrm>
+            <a:off x="609600" y="1600200"/>
+            <a:ext cx="9247321" cy="4525963"/>
+          </a:xfrm>
+        </p:spPr>
+        <p:txBody>
+          <a:bodyPr/>
+          <a:lstStyle/>
+          <a:p>
+            <a:r>
+              <a:rPr lang="en-US" smtClean="0"/>
+              <a:t>Piping improves readability of the R code, and also helps simultaneous thinking and writing</a:t>
+            </a:r>
+          </a:p>
+          <a:p>
+            <a:r>
+              <a:rPr lang="en-US" smtClean="0"/>
+              <a:t>Choose between these:</a:t>
+            </a:r>
+          </a:p>
+          <a:p>
+            <a:pPr lvl="1"/>
+            <a:r>
+              <a:rPr lang="en-US" i="1"/>
+              <a:t>iris.new &lt;- mutate(iris,s.area=Sepal.Width*Sepal.Length)</a:t>
+            </a:r>
+            <a:br>
+              <a:rPr lang="en-US" i="1"/>
+            </a:br>
+            <a:r>
+              <a:rPr lang="en-US" i="1"/>
+              <a:t>filter(iris.new,s.area&lt;15</a:t>
+            </a:r>
+            <a:r>
+              <a:rPr lang="en-US" i="1" smtClean="0"/>
+              <a:t>)</a:t>
+            </a:r>
+          </a:p>
+          <a:p>
+            <a:pPr lvl="1"/>
+            <a:r>
+              <a:rPr lang="en-US" i="1" smtClean="0"/>
+              <a:t>filter(mutate(iris,s.area=Sepal.Width*Sepal.Length),s.area&lt;15)</a:t>
+            </a:r>
+            <a:endParaRPr lang="en-US" i="1"/>
+          </a:p>
+          <a:p>
+            <a:pPr lvl="1"/>
+            <a:r>
+              <a:rPr lang="en-US" i="1" smtClean="0"/>
+              <a:t>mutate(iris,s.area=Sepal.Width*Sepal.Length) %&gt;% </a:t>
+            </a:r>
+            <a:br>
+              <a:rPr lang="en-US" i="1" smtClean="0"/>
+            </a:br>
+            <a:r>
+              <a:rPr lang="en-US" i="1" smtClean="0"/>
+              <a:t>filter(s.area&lt;15)</a:t>
+            </a:r>
+          </a:p>
+          <a:p>
+            <a:r>
+              <a:rPr lang="en-US" smtClean="0"/>
+              <a:t>the result on the left becomes the first argument on the right:</a:t>
+            </a:r>
+            <a:br>
+              <a:rPr lang="en-US" smtClean="0"/>
+            </a:br>
+            <a:r>
+              <a:rPr lang="en-US" i="1"/>
+              <a:t>firstfun(x) %&gt;% </a:t>
+            </a:r>
+            <a:r>
+              <a:rPr lang="en-US" i="1" smtClean="0"/>
+              <a:t>secondfun(y) </a:t>
+            </a:r>
+            <a:r>
+              <a:rPr lang="en-US"/>
+              <a:t>is the same as </a:t>
+            </a:r>
+            <a:r>
+              <a:rPr lang="en-US" i="1" smtClean="0"/>
+              <a:t>secondfun(firstfun(x),y)</a:t>
+            </a:r>
+          </a:p>
+        </p:txBody>
+      </p:sp>
+      <p:sp>
+        <p:nvSpPr>
+          <p:cNvPr id="4" name="Date Placeholder 3"/>
+          <p:cNvSpPr>
+            <a:spLocks noGrp="1"/>
+          </p:cNvSpPr>
+          <p:nvPr>
+            <p:ph type="dt" sz="half" idx="10"/>
+          </p:nvPr>
+        </p:nvSpPr>
+        <p:spPr/>
+        <p:txBody>
+          <a:bodyPr/>
+          <a:lstStyle/>
+          <a:p>
+            <a:pPr>
+              <a:defRPr/>
+            </a:pPr>
+            <a:r>
+              <a:rPr lang="fi-FI" smtClean="0"/>
+              <a:t>2017-03-08</a:t>
+            </a:r>
+            <a:endParaRPr lang="en-US"/>
+          </a:p>
+        </p:txBody>
+      </p:sp>
+      <p:sp>
+        <p:nvSpPr>
+          <p:cNvPr id="5" name="Slide Number Placeholder 4"/>
+          <p:cNvSpPr>
+            <a:spLocks noGrp="1"/>
+          </p:cNvSpPr>
+          <p:nvPr>
+            <p:ph type="sldNum" sz="quarter" idx="12"/>
+          </p:nvPr>
+        </p:nvSpPr>
+        <p:spPr/>
+        <p:txBody>
+          <a:bodyPr/>
+          <a:lstStyle/>
+          <a:p>
+            <a:pPr>
+              <a:defRPr/>
+            </a:pPr>
+            <a:fld id="{2BC46539-7FEE-8846-9EF1-6D13C0293C6C}" type="slidenum">
+              <a:rPr lang="en-US" smtClean="0"/>
+              <a:pPr>
+                <a:defRPr/>
+              </a:pPr>
+              <a:t>33</a:t>
+            </a:fld>
+            <a:endParaRPr lang="en-US"/>
+          </a:p>
+        </p:txBody>
+      </p:sp>
+    </p:spTree>
+    <p:extLst>
+      <p:ext uri="{BB962C8B-B14F-4D97-AF65-F5344CB8AC3E}">
+        <p14:creationId xmlns:p14="http://schemas.microsoft.com/office/powerpoint/2010/main" val="1368817280"/>
+      </p:ext>
+    </p:extLst>
+  </p:cSld>
+  <p:clrMapOvr>
+    <a:masterClrMapping/>
+  </p:clrMapOvr>
+  <p:timing>
+    <p:tnLst>
+      <p:par>
+        <p:cTn id="1" dur="indefinite" restart="never" nodeType="tmRoot"/>
+      </p:par>
+    </p:tnLst>
+  </p:timing>
+</p:sld>
+</file>
+
+<file path=ppt/slides/slide34.xml><?xml version="1.0" encoding="utf-8"?>
+<p:sld xmlns:a="http://schemas.openxmlformats.org/drawingml/2006/main" xmlns:r="http://schemas.openxmlformats.org/officeDocument/2006/relationships" xmlns:p="http://schemas.openxmlformats.org/presentationml/2006/main">
+  <p:cSld>
+    <p:spTree>
+      <p:nvGrpSpPr>
+        <p:cNvPr id="1" name=""/>
+        <p:cNvGrpSpPr/>
+        <p:nvPr/>
+      </p:nvGrpSpPr>
+      <p:grpSpPr>
+        <a:xfrm>
+          <a:off x="0" y="0"/>
+          <a:ext cx="0" cy="0"/>
+          <a:chOff x="0" y="0"/>
+          <a:chExt cx="0" cy="0"/>
+        </a:xfrm>
+      </p:grpSpPr>
+      <p:sp>
+        <p:nvSpPr>
+          <p:cNvPr id="2" name="Title 1"/>
+          <p:cNvSpPr>
+            <a:spLocks noGrp="1"/>
+          </p:cNvSpPr>
+          <p:nvPr>
+            <p:ph type="title"/>
+          </p:nvPr>
+        </p:nvSpPr>
+        <p:spPr/>
+        <p:txBody>
+          <a:bodyPr/>
+          <a:lstStyle/>
+          <a:p>
+            <a:r>
+              <a:rPr lang="en-US" smtClean="0"/>
+              <a:t>Tidy data</a:t>
+            </a:r>
+            <a:endParaRPr lang="en-US"/>
+          </a:p>
+        </p:txBody>
+      </p:sp>
+      <p:sp>
+        <p:nvSpPr>
+          <p:cNvPr id="3" name="Content Placeholder 2"/>
+          <p:cNvSpPr>
+            <a:spLocks noGrp="1"/>
+          </p:cNvSpPr>
+          <p:nvPr>
+            <p:ph idx="1"/>
+          </p:nvPr>
+        </p:nvSpPr>
+        <p:spPr/>
+        <p:txBody>
+          <a:bodyPr/>
+          <a:lstStyle/>
+          <a:p>
+            <a:r>
+              <a:rPr lang="en-US" dirty="0" smtClean="0"/>
+              <a:t>Please also read through the vignette of </a:t>
+            </a:r>
+            <a:r>
+              <a:rPr lang="en-US" i="1" dirty="0" err="1" smtClean="0"/>
+              <a:t>tidyr</a:t>
+            </a:r>
+            <a:r>
+              <a:rPr lang="en-US" dirty="0" smtClean="0"/>
+              <a:t> package and/or the JSS article</a:t>
+            </a:r>
+          </a:p>
+          <a:p>
+            <a:r>
+              <a:rPr lang="en-US" dirty="0" smtClean="0"/>
+              <a:t>The short version:</a:t>
+            </a:r>
+          </a:p>
+          <a:p>
+            <a:pPr lvl="1"/>
+            <a:r>
+              <a:rPr lang="en-US" dirty="0" smtClean="0"/>
+              <a:t>you want single columns to be single variables</a:t>
+            </a:r>
+          </a:p>
+          <a:p>
+            <a:pPr lvl="1"/>
+            <a:r>
+              <a:rPr lang="en-US" dirty="0" smtClean="0"/>
+              <a:t>you want single rows to be single observations</a:t>
+            </a:r>
+          </a:p>
+          <a:p>
+            <a:pPr lvl="1"/>
+            <a:r>
+              <a:rPr lang="en-US" dirty="0" smtClean="0"/>
+              <a:t>(you want one type of data in one table)</a:t>
+            </a:r>
+          </a:p>
+          <a:p>
+            <a:r>
+              <a:rPr lang="en-US" dirty="0" smtClean="0"/>
+              <a:t>All of </a:t>
+            </a:r>
+            <a:r>
+              <a:rPr lang="en-US" i="1" dirty="0" err="1" smtClean="0"/>
+              <a:t>tidyverse</a:t>
+            </a:r>
+            <a:r>
+              <a:rPr lang="en-US" dirty="0" smtClean="0"/>
+              <a:t> </a:t>
+            </a:r>
+            <a:r>
+              <a:rPr lang="en-US" smtClean="0"/>
+              <a:t>(</a:t>
+            </a:r>
+            <a:r>
+              <a:rPr lang="en-US" i="1" smtClean="0"/>
+              <a:t>ggplot2</a:t>
+            </a:r>
+            <a:r>
+              <a:rPr lang="en-US" smtClean="0"/>
+              <a:t> </a:t>
+            </a:r>
+            <a:r>
+              <a:rPr lang="en-US" dirty="0" smtClean="0"/>
+              <a:t>in particular) relies on this idea</a:t>
+            </a:r>
+          </a:p>
+          <a:p>
+            <a:pPr lvl="1"/>
+            <a:r>
+              <a:rPr lang="en-US" dirty="0" smtClean="0"/>
+              <a:t>but some other packages / software might not, and you have to deal with this</a:t>
+            </a:r>
+          </a:p>
+          <a:p>
+            <a:r>
+              <a:rPr lang="en-US" dirty="0" smtClean="0"/>
+              <a:t>The relevant functions are </a:t>
+            </a:r>
+            <a:r>
+              <a:rPr lang="en-US" i="1" dirty="0" smtClean="0"/>
+              <a:t>gather</a:t>
+            </a:r>
+            <a:r>
+              <a:rPr lang="en-US" dirty="0" smtClean="0"/>
+              <a:t> and </a:t>
+            </a:r>
+            <a:r>
+              <a:rPr lang="en-US" i="1" dirty="0" smtClean="0"/>
+              <a:t>spread</a:t>
+            </a:r>
+            <a:r>
+              <a:rPr lang="en-US" dirty="0" smtClean="0"/>
+              <a:t>, and </a:t>
+            </a:r>
+            <a:r>
+              <a:rPr lang="en-US" i="1" dirty="0" smtClean="0"/>
+              <a:t>separate</a:t>
+            </a:r>
+            <a:endParaRPr lang="en-US" i="1" dirty="0"/>
+          </a:p>
+        </p:txBody>
+      </p:sp>
+      <p:sp>
+        <p:nvSpPr>
+          <p:cNvPr id="4" name="Date Placeholder 3"/>
+          <p:cNvSpPr>
+            <a:spLocks noGrp="1"/>
+          </p:cNvSpPr>
+          <p:nvPr>
+            <p:ph type="dt" sz="half" idx="10"/>
+          </p:nvPr>
+        </p:nvSpPr>
+        <p:spPr/>
+        <p:txBody>
+          <a:bodyPr/>
+          <a:lstStyle/>
+          <a:p>
+            <a:pPr>
+              <a:defRPr/>
+            </a:pPr>
+            <a:r>
+              <a:rPr lang="fi-FI" smtClean="0"/>
+              <a:t>2017-03-08</a:t>
+            </a:r>
+            <a:endParaRPr lang="en-US"/>
+          </a:p>
+        </p:txBody>
+      </p:sp>
+      <p:sp>
+        <p:nvSpPr>
+          <p:cNvPr id="5" name="Slide Number Placeholder 4"/>
+          <p:cNvSpPr>
+            <a:spLocks noGrp="1"/>
+          </p:cNvSpPr>
+          <p:nvPr>
+            <p:ph type="sldNum" sz="quarter" idx="12"/>
+          </p:nvPr>
+        </p:nvSpPr>
+        <p:spPr/>
+        <p:txBody>
+          <a:bodyPr/>
+          <a:lstStyle/>
+          <a:p>
+            <a:pPr>
+              <a:defRPr/>
+            </a:pPr>
+            <a:fld id="{2BC46539-7FEE-8846-9EF1-6D13C0293C6C}" type="slidenum">
+              <a:rPr lang="en-US" smtClean="0"/>
+              <a:pPr>
+                <a:defRPr/>
+              </a:pPr>
+              <a:t>34</a:t>
+            </a:fld>
+            <a:endParaRPr lang="en-US"/>
+          </a:p>
+        </p:txBody>
+      </p:sp>
+    </p:spTree>
+    <p:extLst>
+      <p:ext uri="{BB962C8B-B14F-4D97-AF65-F5344CB8AC3E}">
+        <p14:creationId xmlns:p14="http://schemas.microsoft.com/office/powerpoint/2010/main" val="915466383"/>
+      </p:ext>
+    </p:extLst>
+  </p:cSld>
+  <p:clrMapOvr>
+    <a:masterClrMapping/>
+  </p:clrMapOvr>
+  <p:timing>
+    <p:tnLst>
+      <p:par>
+        <p:cTn id="1" dur="indefinite" restart="never" nodeType="tmRoot"/>
+      </p:par>
+    </p:tnLst>
+  </p:timing>
+</p:sld>
+</file>
+
+<file path=ppt/slides/slide35.xml><?xml version="1.0" encoding="utf-8"?>
+<p:sld xmlns:a="http://schemas.openxmlformats.org/drawingml/2006/main" xmlns:r="http://schemas.openxmlformats.org/officeDocument/2006/relationships" xmlns:p="http://schemas.openxmlformats.org/presentationml/2006/main">
+  <p:cSld>
+    <p:spTree>
+      <p:nvGrpSpPr>
+        <p:cNvPr id="1" name=""/>
+        <p:cNvGrpSpPr/>
+        <p:nvPr/>
+      </p:nvGrpSpPr>
+      <p:grpSpPr>
+        <a:xfrm>
+          <a:off x="0" y="0"/>
+          <a:ext cx="0" cy="0"/>
+          <a:chOff x="0" y="0"/>
+          <a:chExt cx="0" cy="0"/>
+        </a:xfrm>
+      </p:grpSpPr>
+      <p:sp>
+        <p:nvSpPr>
+          <p:cNvPr id="2" name="Title 1"/>
+          <p:cNvSpPr>
+            <a:spLocks noGrp="1"/>
+          </p:cNvSpPr>
+          <p:nvPr>
+            <p:ph type="title"/>
+          </p:nvPr>
+        </p:nvSpPr>
+        <p:spPr/>
+        <p:txBody>
+          <a:bodyPr/>
+          <a:lstStyle/>
+          <a:p>
+            <a:r>
+              <a:rPr lang="en-US" smtClean="0"/>
+              <a:t>Combining data sets</a:t>
+            </a:r>
+            <a:endParaRPr lang="en-US"/>
+          </a:p>
+        </p:txBody>
+      </p:sp>
+      <p:sp>
+        <p:nvSpPr>
+          <p:cNvPr id="3" name="Content Placeholder 2"/>
+          <p:cNvSpPr>
+            <a:spLocks noGrp="1"/>
+          </p:cNvSpPr>
+          <p:nvPr>
+            <p:ph idx="1"/>
+          </p:nvPr>
+        </p:nvSpPr>
+        <p:spPr/>
+        <p:txBody>
+          <a:bodyPr/>
+          <a:lstStyle/>
+          <a:p>
+            <a:r>
+              <a:rPr lang="en-US" dirty="0" smtClean="0"/>
+              <a:t>When you have two data frames with one (or more) common variable, and you need to combine the data from the two sets, matching the common variable, use one of the </a:t>
+            </a:r>
+            <a:r>
+              <a:rPr lang="en-US" i="1" dirty="0" smtClean="0"/>
+              <a:t>join</a:t>
+            </a:r>
+            <a:r>
+              <a:rPr lang="en-US" dirty="0" smtClean="0"/>
+              <a:t> functions (left, right, inner or full)</a:t>
+            </a:r>
+          </a:p>
+          <a:p>
+            <a:pPr lvl="1"/>
+            <a:r>
+              <a:rPr lang="en-US" dirty="0" smtClean="0"/>
+              <a:t>or </a:t>
+            </a:r>
+            <a:r>
+              <a:rPr lang="en-US" i="1" dirty="0" smtClean="0"/>
+              <a:t>merge</a:t>
+            </a:r>
+            <a:r>
+              <a:rPr lang="en-US" dirty="0" smtClean="0"/>
+              <a:t> from the base R</a:t>
+            </a:r>
+          </a:p>
+          <a:p>
+            <a:pPr lvl="1"/>
+            <a:r>
+              <a:rPr lang="en-US" dirty="0" smtClean="0"/>
+              <a:t>the versions differ in what they do in case there are unmatched values</a:t>
+            </a:r>
+          </a:p>
+          <a:p>
+            <a:r>
+              <a:rPr lang="en-US" dirty="0" smtClean="0"/>
+              <a:t>When you have two data frames with the same variables (columns), you can stick them together with </a:t>
+            </a:r>
+            <a:r>
+              <a:rPr lang="en-US" i="1" dirty="0" err="1" smtClean="0"/>
+              <a:t>bind_rows</a:t>
+            </a:r>
+            <a:endParaRPr lang="en-US" i="1" dirty="0" smtClean="0"/>
+          </a:p>
+          <a:p>
+            <a:pPr lvl="1"/>
+            <a:r>
+              <a:rPr lang="en-US" dirty="0" smtClean="0"/>
+              <a:t>note that the columns need not be in the same order</a:t>
+            </a:r>
+          </a:p>
+          <a:p>
+            <a:pPr lvl="1"/>
+            <a:r>
+              <a:rPr lang="en-US" i="1" dirty="0" err="1" smtClean="0"/>
+              <a:t>bind_cols</a:t>
+            </a:r>
+            <a:r>
+              <a:rPr lang="en-US" dirty="0" smtClean="0"/>
+              <a:t> also exists, but maybe join is what you actually need in that case?</a:t>
+            </a:r>
+            <a:endParaRPr lang="en-US" dirty="0"/>
+          </a:p>
+        </p:txBody>
+      </p:sp>
+      <p:sp>
+        <p:nvSpPr>
+          <p:cNvPr id="4" name="Date Placeholder 3"/>
+          <p:cNvSpPr>
+            <a:spLocks noGrp="1"/>
+          </p:cNvSpPr>
+          <p:nvPr>
+            <p:ph type="dt" sz="half" idx="10"/>
+          </p:nvPr>
+        </p:nvSpPr>
+        <p:spPr/>
+        <p:txBody>
+          <a:bodyPr/>
+          <a:lstStyle/>
+          <a:p>
+            <a:pPr>
+              <a:defRPr/>
+            </a:pPr>
+            <a:r>
+              <a:rPr lang="fi-FI" smtClean="0"/>
+              <a:t>2017-03-08</a:t>
+            </a:r>
+            <a:endParaRPr lang="en-US"/>
+          </a:p>
+        </p:txBody>
+      </p:sp>
+      <p:sp>
+        <p:nvSpPr>
+          <p:cNvPr id="5" name="Slide Number Placeholder 4"/>
+          <p:cNvSpPr>
+            <a:spLocks noGrp="1"/>
+          </p:cNvSpPr>
+          <p:nvPr>
+            <p:ph type="sldNum" sz="quarter" idx="12"/>
+          </p:nvPr>
+        </p:nvSpPr>
+        <p:spPr/>
+        <p:txBody>
+          <a:bodyPr/>
+          <a:lstStyle/>
+          <a:p>
+            <a:pPr>
+              <a:defRPr/>
+            </a:pPr>
+            <a:fld id="{2BC46539-7FEE-8846-9EF1-6D13C0293C6C}" type="slidenum">
+              <a:rPr lang="en-US" smtClean="0"/>
+              <a:pPr>
+                <a:defRPr/>
+              </a:pPr>
+              <a:t>35</a:t>
+            </a:fld>
+            <a:endParaRPr lang="en-US"/>
+          </a:p>
+        </p:txBody>
+      </p:sp>
+    </p:spTree>
+    <p:extLst>
+      <p:ext uri="{BB962C8B-B14F-4D97-AF65-F5344CB8AC3E}">
+        <p14:creationId xmlns:p14="http://schemas.microsoft.com/office/powerpoint/2010/main" val="434757249"/>
+      </p:ext>
+    </p:extLst>
+  </p:cSld>
+  <p:clrMapOvr>
+    <a:masterClrMapping/>
+  </p:clrMapOvr>
+  <p:timing>
+    <p:tnLst>
+      <p:par>
+        <p:cTn id="1" dur="indefinite" restart="never" nodeType="tmRoot"/>
+      </p:par>
+    </p:tnLst>
+  </p:timing>
+</p:sld>
+</file>
+
+<file path=ppt/slides/slide36.xml><?xml version="1.0" encoding="utf-8"?>
+<p:sld xmlns:a="http://schemas.openxmlformats.org/drawingml/2006/main" xmlns:r="http://schemas.openxmlformats.org/officeDocument/2006/relationships" xmlns:p="http://schemas.openxmlformats.org/presentationml/2006/main">
+  <p:cSld>
+    <p:spTree>
+      <p:nvGrpSpPr>
+        <p:cNvPr id="1" name=""/>
+        <p:cNvGrpSpPr/>
+        <p:nvPr/>
+      </p:nvGrpSpPr>
+      <p:grpSpPr>
+        <a:xfrm>
+          <a:off x="0" y="0"/>
+          <a:ext cx="0" cy="0"/>
+          <a:chOff x="0" y="0"/>
+          <a:chExt cx="0" cy="0"/>
+        </a:xfrm>
+      </p:grpSpPr>
+      <p:sp>
+        <p:nvSpPr>
+          <p:cNvPr id="2" name="Text Placeholder 1"/>
+          <p:cNvSpPr>
+            <a:spLocks noGrp="1"/>
+          </p:cNvSpPr>
+          <p:nvPr>
+            <p:ph type="body" sz="quarter" idx="10"/>
+          </p:nvPr>
+        </p:nvSpPr>
+        <p:spPr/>
+        <p:txBody>
+          <a:bodyPr/>
+          <a:lstStyle/>
+          <a:p>
+            <a:r>
+              <a:rPr lang="en-US" smtClean="0"/>
+              <a:t>Seija Sirkiä</a:t>
+            </a:r>
+            <a:endParaRPr lang="en-US"/>
+          </a:p>
+        </p:txBody>
+      </p:sp>
+      <p:sp>
+        <p:nvSpPr>
+          <p:cNvPr id="4" name="Text Placeholder 3"/>
+          <p:cNvSpPr>
+            <a:spLocks noGrp="1"/>
+          </p:cNvSpPr>
+          <p:nvPr>
+            <p:ph type="body" sz="quarter" idx="12"/>
+          </p:nvPr>
+        </p:nvSpPr>
+        <p:spPr>
+          <a:xfrm>
+            <a:off x="3072903" y="4315527"/>
+            <a:ext cx="2735469" cy="1717210"/>
+          </a:xfrm>
+        </p:spPr>
+        <p:txBody>
+          <a:bodyPr/>
+          <a:lstStyle/>
+          <a:p>
+            <a:r>
+              <a:rPr lang="en-US" smtClean="0"/>
+              <a:t>PhD, data scientist, application specialist</a:t>
+            </a:r>
+          </a:p>
+          <a:p>
+            <a:endParaRPr lang="en-US"/>
+          </a:p>
+          <a:p>
+            <a:r>
+              <a:rPr lang="en-US" smtClean="0"/>
+              <a:t>seija.sirkia@csc.fi</a:t>
+            </a:r>
+            <a:endParaRPr lang="en-US"/>
+          </a:p>
+        </p:txBody>
+      </p:sp>
+      <p:sp>
+        <p:nvSpPr>
+          <p:cNvPr id="6" name="Picture Placeholder 5"/>
+          <p:cNvSpPr>
+            <a:spLocks noGrp="1"/>
+          </p:cNvSpPr>
+          <p:nvPr>
+            <p:ph type="pic" sz="quarter" idx="11"/>
+          </p:nvPr>
+        </p:nvSpPr>
+        <p:spPr/>
+      </p:sp>
+    </p:spTree>
+    <p:extLst>
+      <p:ext uri="{BB962C8B-B14F-4D97-AF65-F5344CB8AC3E}">
+        <p14:creationId xmlns:p14="http://schemas.microsoft.com/office/powerpoint/2010/main" val="2061839335"/>
       </p:ext>
     </p:extLst>
   </p:cSld>

</xml_diff>